<commit_message>
avances en el readfolder
</commit_message>
<xml_diff>
--- a/flujo edicion.pptx
+++ b/flujo edicion.pptx
@@ -9,6 +9,7 @@
     <p:sldId id="258" r:id="rId3"/>
     <p:sldId id="256" r:id="rId4"/>
     <p:sldId id="259" r:id="rId5"/>
+    <p:sldId id="260" r:id="rId6"/>
   </p:sldIdLst>
   <p:sldSz cx="12192000" cy="6858000"/>
   <p:notesSz cx="6858000" cy="9144000"/>
@@ -246,7 +247,7 @@
           <a:p>
             <a:fld id="{E142A079-F624-4F06-8292-7991D53C206B}" type="datetimeFigureOut">
               <a:rPr lang="es-419" smtClean="0"/>
-              <a:t>15/1/2020</a:t>
+              <a:t>20/1/2020</a:t>
             </a:fld>
             <a:endParaRPr lang="es-419"/>
           </a:p>
@@ -416,7 +417,7 @@
           <a:p>
             <a:fld id="{E142A079-F624-4F06-8292-7991D53C206B}" type="datetimeFigureOut">
               <a:rPr lang="es-419" smtClean="0"/>
-              <a:t>15/1/2020</a:t>
+              <a:t>20/1/2020</a:t>
             </a:fld>
             <a:endParaRPr lang="es-419"/>
           </a:p>
@@ -596,7 +597,7 @@
           <a:p>
             <a:fld id="{E142A079-F624-4F06-8292-7991D53C206B}" type="datetimeFigureOut">
               <a:rPr lang="es-419" smtClean="0"/>
-              <a:t>15/1/2020</a:t>
+              <a:t>20/1/2020</a:t>
             </a:fld>
             <a:endParaRPr lang="es-419"/>
           </a:p>
@@ -766,7 +767,7 @@
           <a:p>
             <a:fld id="{E142A079-F624-4F06-8292-7991D53C206B}" type="datetimeFigureOut">
               <a:rPr lang="es-419" smtClean="0"/>
-              <a:t>15/1/2020</a:t>
+              <a:t>20/1/2020</a:t>
             </a:fld>
             <a:endParaRPr lang="es-419"/>
           </a:p>
@@ -1012,7 +1013,7 @@
           <a:p>
             <a:fld id="{E142A079-F624-4F06-8292-7991D53C206B}" type="datetimeFigureOut">
               <a:rPr lang="es-419" smtClean="0"/>
-              <a:t>15/1/2020</a:t>
+              <a:t>20/1/2020</a:t>
             </a:fld>
             <a:endParaRPr lang="es-419"/>
           </a:p>
@@ -1244,7 +1245,7 @@
           <a:p>
             <a:fld id="{E142A079-F624-4F06-8292-7991D53C206B}" type="datetimeFigureOut">
               <a:rPr lang="es-419" smtClean="0"/>
-              <a:t>15/1/2020</a:t>
+              <a:t>20/1/2020</a:t>
             </a:fld>
             <a:endParaRPr lang="es-419"/>
           </a:p>
@@ -1611,7 +1612,7 @@
           <a:p>
             <a:fld id="{E142A079-F624-4F06-8292-7991D53C206B}" type="datetimeFigureOut">
               <a:rPr lang="es-419" smtClean="0"/>
-              <a:t>15/1/2020</a:t>
+              <a:t>20/1/2020</a:t>
             </a:fld>
             <a:endParaRPr lang="es-419"/>
           </a:p>
@@ -1729,7 +1730,7 @@
           <a:p>
             <a:fld id="{E142A079-F624-4F06-8292-7991D53C206B}" type="datetimeFigureOut">
               <a:rPr lang="es-419" smtClean="0"/>
-              <a:t>15/1/2020</a:t>
+              <a:t>20/1/2020</a:t>
             </a:fld>
             <a:endParaRPr lang="es-419"/>
           </a:p>
@@ -1824,7 +1825,7 @@
           <a:p>
             <a:fld id="{E142A079-F624-4F06-8292-7991D53C206B}" type="datetimeFigureOut">
               <a:rPr lang="es-419" smtClean="0"/>
-              <a:t>15/1/2020</a:t>
+              <a:t>20/1/2020</a:t>
             </a:fld>
             <a:endParaRPr lang="es-419"/>
           </a:p>
@@ -2101,7 +2102,7 @@
           <a:p>
             <a:fld id="{E142A079-F624-4F06-8292-7991D53C206B}" type="datetimeFigureOut">
               <a:rPr lang="es-419" smtClean="0"/>
-              <a:t>15/1/2020</a:t>
+              <a:t>20/1/2020</a:t>
             </a:fld>
             <a:endParaRPr lang="es-419"/>
           </a:p>
@@ -2354,7 +2355,7 @@
           <a:p>
             <a:fld id="{E142A079-F624-4F06-8292-7991D53C206B}" type="datetimeFigureOut">
               <a:rPr lang="es-419" smtClean="0"/>
-              <a:t>15/1/2020</a:t>
+              <a:t>20/1/2020</a:t>
             </a:fld>
             <a:endParaRPr lang="es-419"/>
           </a:p>
@@ -2567,7 +2568,7 @@
           <a:p>
             <a:fld id="{E142A079-F624-4F06-8292-7991D53C206B}" type="datetimeFigureOut">
               <a:rPr lang="es-419" smtClean="0"/>
-              <a:t>15/1/2020</a:t>
+              <a:t>20/1/2020</a:t>
             </a:fld>
             <a:endParaRPr lang="es-419"/>
           </a:p>
@@ -7466,14 +7467,97 @@
       </p:grpSpPr>
       <p:sp>
         <p:nvSpPr>
-          <p:cNvPr id="4" name="Rectángulo 3"/>
+          <p:cNvPr id="2" name="Rectángulo 1"/>
           <p:cNvSpPr/>
           <p:nvPr/>
         </p:nvSpPr>
         <p:spPr>
           <a:xfrm>
-            <a:off x="463639" y="566670"/>
-            <a:ext cx="1146220" cy="502276"/>
+            <a:off x="463639" y="528034"/>
+            <a:ext cx="1828800" cy="914400"/>
+          </a:xfrm>
+          <a:prstGeom prst="rect">
+            <a:avLst/>
+          </a:prstGeom>
+        </p:spPr>
+        <p:style>
+          <a:lnRef idx="2">
+            <a:schemeClr val="accent1">
+              <a:shade val="50000"/>
+            </a:schemeClr>
+          </a:lnRef>
+          <a:fillRef idx="1">
+            <a:schemeClr val="accent1"/>
+          </a:fillRef>
+          <a:effectRef idx="0">
+            <a:schemeClr val="accent1"/>
+          </a:effectRef>
+          <a:fontRef idx="minor">
+            <a:schemeClr val="lt1"/>
+          </a:fontRef>
+        </p:style>
+        <p:txBody>
+          <a:bodyPr rtlCol="0" anchor="ctr"/>
+          <a:lstStyle/>
+          <a:p>
+            <a:pPr algn="ctr"/>
+            <a:r>
+              <a:rPr lang="es-CL" b="1" dirty="0" err="1" smtClean="0">
+                <a:solidFill>
+                  <a:srgbClr val="C00000"/>
+                </a:solidFill>
+              </a:rPr>
+              <a:t>Boton</a:t>
+            </a:r>
+            <a:r>
+              <a:rPr lang="es-CL" b="1" dirty="0" smtClean="0">
+                <a:solidFill>
+                  <a:srgbClr val="C00000"/>
+                </a:solidFill>
+              </a:rPr>
+              <a:t> guardar</a:t>
+            </a:r>
+          </a:p>
+          <a:p>
+            <a:pPr algn="ctr"/>
+            <a:r>
+              <a:rPr lang="es-CL" dirty="0" err="1" smtClean="0"/>
+              <a:t>actionButton</a:t>
+            </a:r>
+            <a:endParaRPr lang="es-CL" dirty="0" smtClean="0"/>
+          </a:p>
+          <a:p>
+            <a:pPr algn="ctr"/>
+            <a:r>
+              <a:rPr lang="es-CL" sz="1600" dirty="0" err="1" smtClean="0">
+                <a:solidFill>
+                  <a:schemeClr val="tx1"/>
+                </a:solidFill>
+                <a:latin typeface="Courier New" panose="02070309020205020404" pitchFamily="49" charset="0"/>
+                <a:cs typeface="Courier New" panose="02070309020205020404" pitchFamily="49" charset="0"/>
+              </a:rPr>
+              <a:t>input$saveDir</a:t>
+            </a:r>
+            <a:endParaRPr lang="es-CL" sz="1600" dirty="0" smtClean="0">
+              <a:solidFill>
+                <a:schemeClr val="tx1"/>
+              </a:solidFill>
+              <a:latin typeface="Courier New" panose="02070309020205020404" pitchFamily="49" charset="0"/>
+              <a:cs typeface="Courier New" panose="02070309020205020404" pitchFamily="49" charset="0"/>
+            </a:endParaRPr>
+          </a:p>
+        </p:txBody>
+      </p:sp>
+      <p:sp>
+        <p:nvSpPr>
+          <p:cNvPr id="12" name="Rectángulo 11"/>
+          <p:cNvSpPr/>
+          <p:nvPr/>
+        </p:nvSpPr>
+        <p:spPr>
+          <a:xfrm>
+            <a:off x="2581142" y="528033"/>
+            <a:ext cx="3972058" cy="914401"/>
           </a:xfrm>
           <a:prstGeom prst="rect">
             <a:avLst/>
@@ -7501,38 +7585,129 @@
           <a:p>
             <a:pPr algn="ctr"/>
             <a:r>
-              <a:rPr lang="es-CL" sz="1600" dirty="0" smtClean="0"/>
-              <a:t>Defecto</a:t>
-            </a:r>
-            <a:br>
-              <a:rPr lang="es-CL" sz="1600" dirty="0" smtClean="0"/>
-            </a:br>
+              <a:rPr lang="es-CL" b="1" dirty="0" smtClean="0">
+                <a:solidFill>
+                  <a:srgbClr val="C00000"/>
+                </a:solidFill>
+              </a:rPr>
+              <a:t>Mostrar ruta</a:t>
+            </a:r>
+          </a:p>
+          <a:p>
+            <a:pPr algn="ctr"/>
+            <a:r>
+              <a:rPr lang="es-CL" dirty="0" err="1" smtClean="0"/>
+              <a:t>verbatimTextOutput</a:t>
+            </a:r>
+            <a:endParaRPr lang="es-CL" dirty="0" smtClean="0"/>
+          </a:p>
+          <a:p>
+            <a:pPr algn="ctr"/>
             <a:r>
               <a:rPr lang="es-CL" sz="1600" dirty="0" err="1" smtClean="0">
                 <a:solidFill>
-                  <a:srgbClr val="0070C0"/>
+                  <a:schemeClr val="tx1"/>
+                </a:solidFill>
+                <a:latin typeface="Courier New" panose="02070309020205020404" pitchFamily="49" charset="0"/>
+                <a:cs typeface="Courier New" panose="02070309020205020404" pitchFamily="49" charset="0"/>
+              </a:rPr>
+              <a:t>output$wdFolderTxt</a:t>
+            </a:r>
+            <a:endParaRPr lang="es-CL" sz="1600" dirty="0" smtClean="0">
+              <a:solidFill>
+                <a:schemeClr val="tx1"/>
+              </a:solidFill>
+              <a:latin typeface="Courier New" panose="02070309020205020404" pitchFamily="49" charset="0"/>
+              <a:cs typeface="Courier New" panose="02070309020205020404" pitchFamily="49" charset="0"/>
+            </a:endParaRPr>
+          </a:p>
+        </p:txBody>
+      </p:sp>
+      <p:sp>
+        <p:nvSpPr>
+          <p:cNvPr id="13" name="Rectángulo 12"/>
+          <p:cNvSpPr/>
+          <p:nvPr/>
+        </p:nvSpPr>
+        <p:spPr>
+          <a:xfrm>
+            <a:off x="6841903" y="528033"/>
+            <a:ext cx="2230190" cy="914401"/>
+          </a:xfrm>
+          <a:prstGeom prst="rect">
+            <a:avLst/>
+          </a:prstGeom>
+        </p:spPr>
+        <p:style>
+          <a:lnRef idx="2">
+            <a:schemeClr val="accent1">
+              <a:shade val="50000"/>
+            </a:schemeClr>
+          </a:lnRef>
+          <a:fillRef idx="1">
+            <a:schemeClr val="accent1"/>
+          </a:fillRef>
+          <a:effectRef idx="0">
+            <a:schemeClr val="accent1"/>
+          </a:effectRef>
+          <a:fontRef idx="minor">
+            <a:schemeClr val="lt1"/>
+          </a:fontRef>
+        </p:style>
+        <p:txBody>
+          <a:bodyPr rtlCol="0" anchor="ctr"/>
+          <a:lstStyle/>
+          <a:p>
+            <a:pPr algn="ctr"/>
+            <a:r>
+              <a:rPr lang="es-CL" b="1" dirty="0" smtClean="0">
+                <a:solidFill>
+                  <a:srgbClr val="C00000"/>
                 </a:solidFill>
               </a:rPr>
-              <a:t>saveDir</a:t>
-            </a:r>
-            <a:endParaRPr lang="es-419" sz="1600" dirty="0">
+              <a:t>Buscar Directorio</a:t>
+            </a:r>
+          </a:p>
+          <a:p>
+            <a:pPr algn="ctr"/>
+            <a:r>
+              <a:rPr lang="es-CL" dirty="0" err="1" smtClean="0"/>
+              <a:t>shinyDirButton</a:t>
+            </a:r>
+            <a:endParaRPr lang="es-CL" dirty="0" smtClean="0"/>
+          </a:p>
+          <a:p>
+            <a:pPr algn="ctr"/>
+            <a:r>
+              <a:rPr lang="es-419" sz="1600" dirty="0" err="1" smtClean="0">
+                <a:solidFill>
+                  <a:schemeClr val="tx1"/>
+                </a:solidFill>
+                <a:latin typeface="Courier New" panose="02070309020205020404" pitchFamily="49" charset="0"/>
+                <a:cs typeface="Courier New" panose="02070309020205020404" pitchFamily="49" charset="0"/>
+              </a:rPr>
+              <a:t>input$BrowsePath</a:t>
+            </a:r>
+            <a:endParaRPr lang="es-419" dirty="0">
               <a:solidFill>
-                <a:srgbClr val="0070C0"/>
+                <a:schemeClr val="tx1"/>
               </a:solidFill>
+              <a:latin typeface="Courier New" panose="02070309020205020404" pitchFamily="49" charset="0"/>
+              <a:cs typeface="Courier New" panose="02070309020205020404" pitchFamily="49" charset="0"/>
             </a:endParaRPr>
           </a:p>
         </p:txBody>
       </p:sp>
       <p:sp>
         <p:nvSpPr>
-          <p:cNvPr id="5" name="Rectángulo 4"/>
+          <p:cNvPr id="14" name="Rectángulo 13"/>
           <p:cNvSpPr/>
           <p:nvPr/>
         </p:nvSpPr>
         <p:spPr>
           <a:xfrm>
-            <a:off x="1906073" y="566670"/>
-            <a:ext cx="3876541" cy="502276"/>
+            <a:off x="9360796" y="528033"/>
+            <a:ext cx="2152917" cy="914401"/>
           </a:xfrm>
           <a:prstGeom prst="rect">
             <a:avLst/>
@@ -7540,13 +7715,88 @@
         </p:spPr>
         <p:style>
           <a:lnRef idx="2">
-            <a:schemeClr val="dk1"/>
+            <a:schemeClr val="accent1">
+              <a:shade val="50000"/>
+            </a:schemeClr>
+          </a:lnRef>
+          <a:fillRef idx="1">
+            <a:schemeClr val="accent1"/>
+          </a:fillRef>
+          <a:effectRef idx="0">
+            <a:schemeClr val="accent1"/>
+          </a:effectRef>
+          <a:fontRef idx="minor">
+            <a:schemeClr val="lt1"/>
+          </a:fontRef>
+        </p:style>
+        <p:txBody>
+          <a:bodyPr rtlCol="0" anchor="ctr"/>
+          <a:lstStyle/>
+          <a:p>
+            <a:pPr algn="ctr"/>
+            <a:r>
+              <a:rPr lang="es-CL" b="1" dirty="0" smtClean="0">
+                <a:solidFill>
+                  <a:srgbClr val="C00000"/>
+                </a:solidFill>
+              </a:rPr>
+              <a:t>Cargar directorio</a:t>
+            </a:r>
+          </a:p>
+          <a:p>
+            <a:pPr algn="ctr"/>
+            <a:r>
+              <a:rPr lang="es-CL" dirty="0" err="1" smtClean="0"/>
+              <a:t>actionButton</a:t>
+            </a:r>
+            <a:endParaRPr lang="es-CL" dirty="0" smtClean="0"/>
+          </a:p>
+          <a:p>
+            <a:pPr algn="ctr"/>
+            <a:r>
+              <a:rPr lang="es-CL" sz="1600" dirty="0" err="1" smtClean="0">
+                <a:solidFill>
+                  <a:schemeClr val="tx1"/>
+                </a:solidFill>
+                <a:latin typeface="Courier New" panose="02070309020205020404" pitchFamily="49" charset="0"/>
+                <a:cs typeface="Courier New" panose="02070309020205020404" pitchFamily="49" charset="0"/>
+              </a:rPr>
+              <a:t>input$btn_cargar</a:t>
+            </a:r>
+            <a:endParaRPr lang="es-CL" sz="1600" dirty="0" smtClean="0">
+              <a:solidFill>
+                <a:schemeClr val="tx1"/>
+              </a:solidFill>
+              <a:latin typeface="Courier New" panose="02070309020205020404" pitchFamily="49" charset="0"/>
+              <a:cs typeface="Courier New" panose="02070309020205020404" pitchFamily="49" charset="0"/>
+            </a:endParaRPr>
+          </a:p>
+        </p:txBody>
+      </p:sp>
+      <p:sp>
+        <p:nvSpPr>
+          <p:cNvPr id="15" name="Rectángulo 14"/>
+          <p:cNvSpPr/>
+          <p:nvPr/>
+        </p:nvSpPr>
+        <p:spPr>
+          <a:xfrm>
+            <a:off x="7956998" y="1635617"/>
+            <a:ext cx="3556715" cy="4739425"/>
+          </a:xfrm>
+          <a:prstGeom prst="rect">
+            <a:avLst/>
+          </a:prstGeom>
+        </p:spPr>
+        <p:style>
+          <a:lnRef idx="2">
+            <a:schemeClr val="accent1"/>
           </a:lnRef>
           <a:fillRef idx="1">
             <a:schemeClr val="lt1"/>
           </a:fillRef>
           <a:effectRef idx="0">
-            <a:schemeClr val="dk1"/>
+            <a:schemeClr val="accent1"/>
           </a:effectRef>
           <a:fontRef idx="minor">
             <a:schemeClr val="dk1"/>
@@ -7559,30 +7809,85 @@
             <a:pPr algn="ctr"/>
             <a:r>
               <a:rPr lang="es-CL" dirty="0" err="1" smtClean="0"/>
-              <a:t>out</a:t>
+              <a:t>Parametros</a:t>
             </a:r>
             <a:r>
               <a:rPr lang="es-CL" dirty="0" smtClean="0"/>
-              <a:t>: </a:t>
-            </a:r>
-            <a:r>
-              <a:rPr lang="es-CL" dirty="0" err="1" smtClean="0"/>
-              <a:t>wdFolderTxt</a:t>
-            </a:r>
-            <a:endParaRPr lang="es-419" dirty="0"/>
-          </a:p>
-        </p:txBody>
-      </p:sp>
-      <p:sp>
-        <p:nvSpPr>
-          <p:cNvPr id="6" name="Rectángulo 5"/>
+              <a:t> para la detección</a:t>
+            </a:r>
+          </a:p>
+          <a:p>
+            <a:pPr algn="ctr"/>
+            <a:r>
+              <a:rPr lang="es-CL" sz="1600" dirty="0" err="1" smtClean="0">
+                <a:solidFill>
+                  <a:schemeClr val="tx1"/>
+                </a:solidFill>
+                <a:latin typeface="Courier New" panose="02070309020205020404" pitchFamily="49" charset="0"/>
+                <a:cs typeface="Courier New" panose="02070309020205020404" pitchFamily="49" charset="0"/>
+              </a:rPr>
+              <a:t>htmlOutput</a:t>
+            </a:r>
+            <a:endParaRPr lang="es-CL" sz="1600" dirty="0" smtClean="0">
+              <a:solidFill>
+                <a:schemeClr val="tx1"/>
+              </a:solidFill>
+              <a:latin typeface="Courier New" panose="02070309020205020404" pitchFamily="49" charset="0"/>
+              <a:cs typeface="Courier New" panose="02070309020205020404" pitchFamily="49" charset="0"/>
+            </a:endParaRPr>
+          </a:p>
+          <a:p>
+            <a:pPr algn="ctr"/>
+            <a:r>
+              <a:rPr lang="es-CL" sz="1600" dirty="0" err="1" smtClean="0">
+                <a:solidFill>
+                  <a:schemeClr val="tx1"/>
+                </a:solidFill>
+                <a:latin typeface="Courier New" panose="02070309020205020404" pitchFamily="49" charset="0"/>
+                <a:cs typeface="Courier New" panose="02070309020205020404" pitchFamily="49" charset="0"/>
+              </a:rPr>
+              <a:t>output$showSet</a:t>
+            </a:r>
+            <a:r>
+              <a:rPr lang="es-CL" sz="1600" dirty="0" smtClean="0">
+                <a:solidFill>
+                  <a:schemeClr val="tx1"/>
+                </a:solidFill>
+                <a:latin typeface="Courier New" panose="02070309020205020404" pitchFamily="49" charset="0"/>
+                <a:cs typeface="Courier New" panose="02070309020205020404" pitchFamily="49" charset="0"/>
+              </a:rPr>
+              <a:t> &lt;- </a:t>
+            </a:r>
+            <a:r>
+              <a:rPr lang="es-CL" sz="1600" dirty="0" err="1" smtClean="0">
+                <a:solidFill>
+                  <a:schemeClr val="tx1"/>
+                </a:solidFill>
+                <a:latin typeface="Courier New" panose="02070309020205020404" pitchFamily="49" charset="0"/>
+                <a:cs typeface="Courier New" panose="02070309020205020404" pitchFamily="49" charset="0"/>
+              </a:rPr>
+              <a:t>renderUI</a:t>
+            </a:r>
+            <a:endParaRPr lang="es-419" sz="1600" dirty="0">
+              <a:solidFill>
+                <a:schemeClr val="tx1"/>
+              </a:solidFill>
+              <a:latin typeface="Courier New" panose="02070309020205020404" pitchFamily="49" charset="0"/>
+              <a:cs typeface="Courier New" panose="02070309020205020404" pitchFamily="49" charset="0"/>
+            </a:endParaRPr>
+          </a:p>
+        </p:txBody>
+      </p:sp>
+      <p:sp>
+        <p:nvSpPr>
+          <p:cNvPr id="16" name="Rectángulo 15"/>
           <p:cNvSpPr/>
           <p:nvPr/>
         </p:nvSpPr>
         <p:spPr>
           <a:xfrm>
-            <a:off x="6078827" y="566670"/>
-            <a:ext cx="1403797" cy="502276"/>
+            <a:off x="463639" y="1635617"/>
+            <a:ext cx="3953815" cy="4739425"/>
           </a:xfrm>
           <a:prstGeom prst="rect">
             <a:avLst/>
@@ -7590,15 +7895,15 @@
         </p:spPr>
         <p:style>
           <a:lnRef idx="2">
-            <a:schemeClr val="accent3">
+            <a:schemeClr val="accent1">
               <a:shade val="50000"/>
             </a:schemeClr>
           </a:lnRef>
           <a:fillRef idx="1">
-            <a:schemeClr val="accent3"/>
+            <a:schemeClr val="accent1"/>
           </a:fillRef>
           <a:effectRef idx="0">
-            <a:schemeClr val="accent3"/>
+            <a:schemeClr val="accent1"/>
           </a:effectRef>
           <a:fontRef idx="minor">
             <a:schemeClr val="lt1"/>
@@ -7610,70 +7915,663 @@
           <a:p>
             <a:pPr algn="ctr"/>
             <a:r>
-              <a:rPr lang="es-CL" sz="1600" dirty="0" smtClean="0"/>
-              <a:t>Buscar</a:t>
-            </a:r>
+              <a:rPr lang="es-CL" b="1" dirty="0" smtClean="0">
+                <a:solidFill>
+                  <a:srgbClr val="C00000"/>
+                </a:solidFill>
+              </a:rPr>
+              <a:t>Tabla directorio con AWD</a:t>
+            </a:r>
+          </a:p>
+          <a:p>
+            <a:pPr algn="ctr"/>
+            <a:r>
+              <a:rPr lang="es-CL" dirty="0" err="1" smtClean="0"/>
+              <a:t>tableOutput</a:t>
+            </a:r>
+            <a:endParaRPr lang="es-CL" dirty="0" smtClean="0"/>
           </a:p>
           <a:p>
             <a:pPr algn="ctr"/>
             <a:r>
               <a:rPr lang="es-CL" sz="1600" dirty="0" err="1" smtClean="0">
                 <a:solidFill>
-                  <a:srgbClr val="0070C0"/>
+                  <a:schemeClr val="tx1"/>
+                </a:solidFill>
+                <a:latin typeface="Courier New" panose="02070309020205020404" pitchFamily="49" charset="0"/>
+                <a:cs typeface="Courier New" panose="02070309020205020404" pitchFamily="49" charset="0"/>
+              </a:rPr>
+              <a:t>output$dfdir</a:t>
+            </a:r>
+            <a:r>
+              <a:rPr lang="es-CL" sz="1600" dirty="0" smtClean="0">
+                <a:solidFill>
+                  <a:schemeClr val="tx1"/>
+                </a:solidFill>
+                <a:latin typeface="Courier New" panose="02070309020205020404" pitchFamily="49" charset="0"/>
+                <a:cs typeface="Courier New" panose="02070309020205020404" pitchFamily="49" charset="0"/>
+              </a:rPr>
+              <a:t> – </a:t>
+            </a:r>
+            <a:r>
+              <a:rPr lang="es-CL" sz="1600" dirty="0" err="1" smtClean="0">
+                <a:solidFill>
+                  <a:schemeClr val="tx1"/>
+                </a:solidFill>
+                <a:latin typeface="Courier New" panose="02070309020205020404" pitchFamily="49" charset="0"/>
+                <a:cs typeface="Courier New" panose="02070309020205020404" pitchFamily="49" charset="0"/>
+              </a:rPr>
+              <a:t>input$filterDir</a:t>
+            </a:r>
+            <a:endParaRPr lang="es-419" dirty="0">
+              <a:solidFill>
+                <a:schemeClr val="tx1"/>
+              </a:solidFill>
+              <a:latin typeface="Courier New" panose="02070309020205020404" pitchFamily="49" charset="0"/>
+              <a:cs typeface="Courier New" panose="02070309020205020404" pitchFamily="49" charset="0"/>
+            </a:endParaRPr>
+          </a:p>
+        </p:txBody>
+      </p:sp>
+      <p:sp>
+        <p:nvSpPr>
+          <p:cNvPr id="17" name="Rectángulo 16"/>
+          <p:cNvSpPr/>
+          <p:nvPr/>
+        </p:nvSpPr>
+        <p:spPr>
+          <a:xfrm>
+            <a:off x="5112914" y="1635617"/>
+            <a:ext cx="2176528" cy="2112135"/>
+          </a:xfrm>
+          <a:prstGeom prst="rect">
+            <a:avLst/>
+          </a:prstGeom>
+        </p:spPr>
+        <p:style>
+          <a:lnRef idx="2">
+            <a:schemeClr val="accent1">
+              <a:shade val="50000"/>
+            </a:schemeClr>
+          </a:lnRef>
+          <a:fillRef idx="1">
+            <a:schemeClr val="accent1"/>
+          </a:fillRef>
+          <a:effectRef idx="0">
+            <a:schemeClr val="accent1"/>
+          </a:effectRef>
+          <a:fontRef idx="minor">
+            <a:schemeClr val="lt1"/>
+          </a:fontRef>
+        </p:style>
+        <p:txBody>
+          <a:bodyPr rtlCol="0" anchor="ctr"/>
+          <a:lstStyle/>
+          <a:p>
+            <a:pPr algn="ctr"/>
+            <a:r>
+              <a:rPr lang="es-CL" b="1" dirty="0" smtClean="0">
+                <a:solidFill>
+                  <a:srgbClr val="C00000"/>
                 </a:solidFill>
               </a:rPr>
-              <a:t>Browse</a:t>
-            </a:r>
+              <a:t>Selección categoría de filtrado</a:t>
+            </a:r>
+          </a:p>
+          <a:p>
+            <a:pPr algn="ctr"/>
+            <a:r>
+              <a:rPr lang="es-CL" dirty="0" err="1" smtClean="0"/>
+              <a:t>radioButtons</a:t>
+            </a:r>
+            <a:endParaRPr lang="es-CL" dirty="0" smtClean="0"/>
+          </a:p>
+          <a:p>
+            <a:pPr algn="ctr"/>
             <a:r>
               <a:rPr lang="es-CL" sz="1600" dirty="0" err="1" smtClean="0">
                 <a:solidFill>
-                  <a:srgbClr val="0070C0"/>
+                  <a:schemeClr val="tx1"/>
+                </a:solidFill>
+                <a:latin typeface="Courier New" panose="02070309020205020404" pitchFamily="49" charset="0"/>
+                <a:cs typeface="Courier New" panose="02070309020205020404" pitchFamily="49" charset="0"/>
+              </a:rPr>
+              <a:t>input$filterdir</a:t>
+            </a:r>
+            <a:endParaRPr lang="es-419" dirty="0">
+              <a:solidFill>
+                <a:schemeClr val="tx1"/>
+              </a:solidFill>
+              <a:latin typeface="Courier New" panose="02070309020205020404" pitchFamily="49" charset="0"/>
+              <a:cs typeface="Courier New" panose="02070309020205020404" pitchFamily="49" charset="0"/>
+            </a:endParaRPr>
+          </a:p>
+        </p:txBody>
+      </p:sp>
+      <p:sp>
+        <p:nvSpPr>
+          <p:cNvPr id="18" name="Rectángulo 17"/>
+          <p:cNvSpPr/>
+          <p:nvPr/>
+        </p:nvSpPr>
+        <p:spPr>
+          <a:xfrm>
+            <a:off x="5112914" y="4262907"/>
+            <a:ext cx="2176528" cy="2112135"/>
+          </a:xfrm>
+          <a:prstGeom prst="rect">
+            <a:avLst/>
+          </a:prstGeom>
+        </p:spPr>
+        <p:style>
+          <a:lnRef idx="2">
+            <a:schemeClr val="accent1">
+              <a:shade val="50000"/>
+            </a:schemeClr>
+          </a:lnRef>
+          <a:fillRef idx="1">
+            <a:schemeClr val="accent1"/>
+          </a:fillRef>
+          <a:effectRef idx="0">
+            <a:schemeClr val="accent1"/>
+          </a:effectRef>
+          <a:fontRef idx="minor">
+            <a:schemeClr val="lt1"/>
+          </a:fontRef>
+        </p:style>
+        <p:txBody>
+          <a:bodyPr rtlCol="0" anchor="ctr"/>
+          <a:lstStyle/>
+          <a:p>
+            <a:pPr algn="ctr"/>
+            <a:r>
+              <a:rPr lang="es-CL" b="1" dirty="0" smtClean="0">
+                <a:solidFill>
+                  <a:srgbClr val="C00000"/>
                 </a:solidFill>
               </a:rPr>
-              <a:t>Path</a:t>
+              <a:t>Tabla de recuentos por status </a:t>
+            </a:r>
+            <a:r>
+              <a:rPr lang="es-CL" b="1" dirty="0" err="1" smtClean="0">
+                <a:solidFill>
+                  <a:srgbClr val="C00000"/>
+                </a:solidFill>
+              </a:rPr>
+              <a:t>edicion</a:t>
+            </a:r>
+            <a:endParaRPr lang="es-CL" b="1" dirty="0" smtClean="0">
+              <a:solidFill>
+                <a:srgbClr val="C00000"/>
+              </a:solidFill>
+            </a:endParaRPr>
+          </a:p>
+          <a:p>
+            <a:pPr algn="ctr"/>
+            <a:r>
+              <a:rPr lang="es-CL" dirty="0" err="1" smtClean="0"/>
+              <a:t>tableOutput</a:t>
+            </a:r>
+            <a:endParaRPr lang="es-CL" dirty="0" smtClean="0"/>
+          </a:p>
+          <a:p>
+            <a:pPr algn="ctr"/>
+            <a:r>
+              <a:rPr lang="es-CL" sz="1600" dirty="0" err="1" smtClean="0">
+                <a:solidFill>
+                  <a:schemeClr val="tx1"/>
+                </a:solidFill>
+                <a:latin typeface="Courier New" panose="02070309020205020404" pitchFamily="49" charset="0"/>
+                <a:cs typeface="Courier New" panose="02070309020205020404" pitchFamily="49" charset="0"/>
+              </a:rPr>
+              <a:t>output$tableDir</a:t>
             </a:r>
             <a:endParaRPr lang="es-419" sz="1600" dirty="0">
               <a:solidFill>
-                <a:srgbClr val="0070C0"/>
+                <a:schemeClr val="tx1"/>
               </a:solidFill>
+              <a:latin typeface="Courier New" panose="02070309020205020404" pitchFamily="49" charset="0"/>
+              <a:cs typeface="Courier New" panose="02070309020205020404" pitchFamily="49" charset="0"/>
             </a:endParaRPr>
           </a:p>
         </p:txBody>
       </p:sp>
-      <p:cxnSp>
-        <p:nvCxnSpPr>
-          <p:cNvPr id="8" name="Conector recto 7"/>
-          <p:cNvCxnSpPr/>
-          <p:nvPr/>
-        </p:nvCxnSpPr>
-        <p:spPr>
-          <a:xfrm flipH="1">
-            <a:off x="7727324" y="347730"/>
-            <a:ext cx="0" cy="5885645"/>
-          </a:xfrm>
-          <a:prstGeom prst="line">
-            <a:avLst/>
-          </a:prstGeom>
-        </p:spPr>
-        <p:style>
-          <a:lnRef idx="1">
-            <a:schemeClr val="accent1"/>
-          </a:lnRef>
-          <a:fillRef idx="0">
-            <a:schemeClr val="accent1"/>
-          </a:fillRef>
-          <a:effectRef idx="0">
-            <a:schemeClr val="accent1"/>
-          </a:effectRef>
-          <a:fontRef idx="minor">
-            <a:schemeClr val="tx1"/>
-          </a:fontRef>
-        </p:style>
-      </p:cxnSp>
     </p:spTree>
     <p:extLst>
       <p:ext uri="{BB962C8B-B14F-4D97-AF65-F5344CB8AC3E}">
         <p14:creationId xmlns:p14="http://schemas.microsoft.com/office/powerpoint/2010/main" val="1103684499"/>
+      </p:ext>
+    </p:extLst>
+  </p:cSld>
+  <p:clrMapOvr>
+    <a:masterClrMapping/>
+  </p:clrMapOvr>
+  <p:timing>
+    <p:tnLst>
+      <p:par>
+        <p:cTn id="1" dur="indefinite" restart="never" nodeType="tmRoot"/>
+      </p:par>
+    </p:tnLst>
+  </p:timing>
+</p:sld>
+</file>
+
+<file path=ppt/slides/slide5.xml><?xml version="1.0" encoding="utf-8"?>
+<p:sld xmlns:a="http://schemas.openxmlformats.org/drawingml/2006/main" xmlns:r="http://schemas.openxmlformats.org/officeDocument/2006/relationships" xmlns:p="http://schemas.openxmlformats.org/presentationml/2006/main">
+  <p:cSld>
+    <p:spTree>
+      <p:nvGrpSpPr>
+        <p:cNvPr id="1" name=""/>
+        <p:cNvGrpSpPr/>
+        <p:nvPr/>
+      </p:nvGrpSpPr>
+      <p:grpSpPr>
+        <a:xfrm>
+          <a:off x="0" y="0"/>
+          <a:ext cx="0" cy="0"/>
+          <a:chOff x="0" y="0"/>
+          <a:chExt cx="0" cy="0"/>
+        </a:xfrm>
+      </p:grpSpPr>
+      <p:sp>
+        <p:nvSpPr>
+          <p:cNvPr id="4" name="Rectángulo 3"/>
+          <p:cNvSpPr/>
+          <p:nvPr/>
+        </p:nvSpPr>
+        <p:spPr>
+          <a:xfrm>
+            <a:off x="412124" y="643943"/>
+            <a:ext cx="2653048" cy="940158"/>
+          </a:xfrm>
+          <a:prstGeom prst="rect">
+            <a:avLst/>
+          </a:prstGeom>
+        </p:spPr>
+        <p:style>
+          <a:lnRef idx="2">
+            <a:schemeClr val="accent1">
+              <a:shade val="50000"/>
+            </a:schemeClr>
+          </a:lnRef>
+          <a:fillRef idx="1">
+            <a:schemeClr val="accent1"/>
+          </a:fillRef>
+          <a:effectRef idx="0">
+            <a:schemeClr val="accent1"/>
+          </a:effectRef>
+          <a:fontRef idx="minor">
+            <a:schemeClr val="lt1"/>
+          </a:fontRef>
+        </p:style>
+        <p:txBody>
+          <a:bodyPr rtlCol="0" anchor="ctr"/>
+          <a:lstStyle/>
+          <a:p>
+            <a:pPr algn="ctr"/>
+            <a:r>
+              <a:rPr lang="es-CL" b="1" dirty="0" err="1" smtClean="0">
+                <a:solidFill>
+                  <a:srgbClr val="C00000"/>
+                </a:solidFill>
+              </a:rPr>
+              <a:t>Cajon</a:t>
+            </a:r>
+            <a:r>
+              <a:rPr lang="es-CL" b="1" dirty="0" smtClean="0">
+                <a:solidFill>
+                  <a:srgbClr val="C00000"/>
+                </a:solidFill>
+              </a:rPr>
+              <a:t> pegar sujeto</a:t>
+            </a:r>
+          </a:p>
+          <a:p>
+            <a:pPr algn="ctr"/>
+            <a:r>
+              <a:rPr lang="es-CL" dirty="0" err="1" smtClean="0"/>
+              <a:t>textInput</a:t>
+            </a:r>
+            <a:endParaRPr lang="es-CL" dirty="0" smtClean="0"/>
+          </a:p>
+          <a:p>
+            <a:pPr algn="ctr"/>
+            <a:r>
+              <a:rPr lang="es-CL" sz="1600" dirty="0" err="1" smtClean="0">
+                <a:solidFill>
+                  <a:schemeClr val="tx1"/>
+                </a:solidFill>
+                <a:latin typeface="Courier New" panose="02070309020205020404" pitchFamily="49" charset="0"/>
+                <a:cs typeface="Courier New" panose="02070309020205020404" pitchFamily="49" charset="0"/>
+              </a:rPr>
+              <a:t>input$awd_paste</a:t>
+            </a:r>
+            <a:endParaRPr lang="es-419" sz="1600" dirty="0">
+              <a:solidFill>
+                <a:schemeClr val="tx1"/>
+              </a:solidFill>
+              <a:latin typeface="Courier New" panose="02070309020205020404" pitchFamily="49" charset="0"/>
+              <a:cs typeface="Courier New" panose="02070309020205020404" pitchFamily="49" charset="0"/>
+            </a:endParaRPr>
+          </a:p>
+        </p:txBody>
+      </p:sp>
+      <p:sp>
+        <p:nvSpPr>
+          <p:cNvPr id="5" name="CuadroTexto 4"/>
+          <p:cNvSpPr txBox="1"/>
+          <p:nvPr/>
+        </p:nvSpPr>
+        <p:spPr>
+          <a:xfrm>
+            <a:off x="412124" y="274611"/>
+            <a:ext cx="2623282" cy="369332"/>
+          </a:xfrm>
+          <a:prstGeom prst="rect">
+            <a:avLst/>
+          </a:prstGeom>
+          <a:noFill/>
+        </p:spPr>
+        <p:txBody>
+          <a:bodyPr wrap="none" rtlCol="0">
+            <a:spAutoFit/>
+          </a:bodyPr>
+          <a:lstStyle/>
+          <a:p>
+            <a:r>
+              <a:rPr lang="es-CL" dirty="0" smtClean="0"/>
+              <a:t>Pegar o seleccionar sujeto</a:t>
+            </a:r>
+          </a:p>
+        </p:txBody>
+      </p:sp>
+      <p:sp>
+        <p:nvSpPr>
+          <p:cNvPr id="7" name="Rectángulo 6"/>
+          <p:cNvSpPr/>
+          <p:nvPr/>
+        </p:nvSpPr>
+        <p:spPr>
+          <a:xfrm>
+            <a:off x="397241" y="1749379"/>
+            <a:ext cx="2653048" cy="1045335"/>
+          </a:xfrm>
+          <a:prstGeom prst="rect">
+            <a:avLst/>
+          </a:prstGeom>
+        </p:spPr>
+        <p:style>
+          <a:lnRef idx="2">
+            <a:schemeClr val="accent1">
+              <a:shade val="50000"/>
+            </a:schemeClr>
+          </a:lnRef>
+          <a:fillRef idx="1">
+            <a:schemeClr val="accent1"/>
+          </a:fillRef>
+          <a:effectRef idx="0">
+            <a:schemeClr val="accent1"/>
+          </a:effectRef>
+          <a:fontRef idx="minor">
+            <a:schemeClr val="lt1"/>
+          </a:fontRef>
+        </p:style>
+        <p:txBody>
+          <a:bodyPr rtlCol="0" anchor="ctr"/>
+          <a:lstStyle/>
+          <a:p>
+            <a:pPr algn="ctr"/>
+            <a:r>
+              <a:rPr lang="es-CL" b="1" dirty="0" smtClean="0">
+                <a:solidFill>
+                  <a:srgbClr val="C00000"/>
+                </a:solidFill>
+              </a:rPr>
+              <a:t>Selector de sujeto</a:t>
+            </a:r>
+          </a:p>
+          <a:p>
+            <a:pPr algn="ctr"/>
+            <a:r>
+              <a:rPr lang="es-CL" dirty="0" err="1" smtClean="0"/>
+              <a:t>uiOutput</a:t>
+            </a:r>
+            <a:endParaRPr lang="es-CL" dirty="0" smtClean="0"/>
+          </a:p>
+          <a:p>
+            <a:pPr algn="ctr"/>
+            <a:r>
+              <a:rPr lang="es-CL" sz="1600" dirty="0" err="1" smtClean="0">
+                <a:solidFill>
+                  <a:schemeClr val="tx1"/>
+                </a:solidFill>
+                <a:latin typeface="Courier New" panose="02070309020205020404" pitchFamily="49" charset="0"/>
+                <a:cs typeface="Courier New" panose="02070309020205020404" pitchFamily="49" charset="0"/>
+              </a:rPr>
+              <a:t>output$subjInput</a:t>
+            </a:r>
+            <a:endParaRPr lang="es-CL" sz="1600" dirty="0" smtClean="0">
+              <a:solidFill>
+                <a:schemeClr val="tx1"/>
+              </a:solidFill>
+              <a:latin typeface="Courier New" panose="02070309020205020404" pitchFamily="49" charset="0"/>
+              <a:cs typeface="Courier New" panose="02070309020205020404" pitchFamily="49" charset="0"/>
+            </a:endParaRPr>
+          </a:p>
+          <a:p>
+            <a:pPr algn="ctr"/>
+            <a:r>
+              <a:rPr lang="es-CL" sz="1600" dirty="0" err="1" smtClean="0">
+                <a:solidFill>
+                  <a:schemeClr val="tx1"/>
+                </a:solidFill>
+                <a:latin typeface="Courier New" panose="02070309020205020404" pitchFamily="49" charset="0"/>
+                <a:cs typeface="Courier New" panose="02070309020205020404" pitchFamily="49" charset="0"/>
+              </a:rPr>
+              <a:t>input$awd_select</a:t>
+            </a:r>
+            <a:endParaRPr lang="es-419" sz="1600" dirty="0">
+              <a:solidFill>
+                <a:schemeClr val="tx1"/>
+              </a:solidFill>
+              <a:latin typeface="Courier New" panose="02070309020205020404" pitchFamily="49" charset="0"/>
+              <a:cs typeface="Courier New" panose="02070309020205020404" pitchFamily="49" charset="0"/>
+            </a:endParaRPr>
+          </a:p>
+        </p:txBody>
+      </p:sp>
+      <p:sp>
+        <p:nvSpPr>
+          <p:cNvPr id="8" name="Rectángulo 7"/>
+          <p:cNvSpPr/>
+          <p:nvPr/>
+        </p:nvSpPr>
+        <p:spPr>
+          <a:xfrm>
+            <a:off x="3436513" y="643943"/>
+            <a:ext cx="2653048" cy="940158"/>
+          </a:xfrm>
+          <a:prstGeom prst="rect">
+            <a:avLst/>
+          </a:prstGeom>
+        </p:spPr>
+        <p:style>
+          <a:lnRef idx="2">
+            <a:schemeClr val="accent1">
+              <a:shade val="50000"/>
+            </a:schemeClr>
+          </a:lnRef>
+          <a:fillRef idx="1">
+            <a:schemeClr val="accent1"/>
+          </a:fillRef>
+          <a:effectRef idx="0">
+            <a:schemeClr val="accent1"/>
+          </a:effectRef>
+          <a:fontRef idx="minor">
+            <a:schemeClr val="lt1"/>
+          </a:fontRef>
+        </p:style>
+        <p:txBody>
+          <a:bodyPr rtlCol="0" anchor="ctr"/>
+          <a:lstStyle/>
+          <a:p>
+            <a:pPr algn="ctr"/>
+            <a:r>
+              <a:rPr lang="es-CL" b="1" dirty="0" err="1" smtClean="0">
+                <a:solidFill>
+                  <a:srgbClr val="C00000"/>
+                </a:solidFill>
+              </a:rPr>
+              <a:t>Cajon</a:t>
+            </a:r>
+            <a:r>
+              <a:rPr lang="es-CL" b="1" dirty="0" smtClean="0">
+                <a:solidFill>
+                  <a:srgbClr val="C00000"/>
+                </a:solidFill>
+              </a:rPr>
+              <a:t> pegar sujeto</a:t>
+            </a:r>
+          </a:p>
+          <a:p>
+            <a:pPr algn="ctr"/>
+            <a:r>
+              <a:rPr lang="es-CL" dirty="0" err="1" smtClean="0"/>
+              <a:t>textInput</a:t>
+            </a:r>
+            <a:endParaRPr lang="es-CL" dirty="0" smtClean="0"/>
+          </a:p>
+          <a:p>
+            <a:pPr algn="ctr"/>
+            <a:r>
+              <a:rPr lang="es-CL" sz="1600" dirty="0" err="1" smtClean="0">
+                <a:solidFill>
+                  <a:schemeClr val="tx1"/>
+                </a:solidFill>
+                <a:latin typeface="Courier New" panose="02070309020205020404" pitchFamily="49" charset="0"/>
+                <a:cs typeface="Courier New" panose="02070309020205020404" pitchFamily="49" charset="0"/>
+              </a:rPr>
+              <a:t>input$awd_paste</a:t>
+            </a:r>
+            <a:endParaRPr lang="es-419" sz="1600" dirty="0">
+              <a:solidFill>
+                <a:schemeClr val="tx1"/>
+              </a:solidFill>
+              <a:latin typeface="Courier New" panose="02070309020205020404" pitchFamily="49" charset="0"/>
+              <a:cs typeface="Courier New" panose="02070309020205020404" pitchFamily="49" charset="0"/>
+            </a:endParaRPr>
+          </a:p>
+        </p:txBody>
+      </p:sp>
+      <p:sp>
+        <p:nvSpPr>
+          <p:cNvPr id="9" name="CuadroTexto 8"/>
+          <p:cNvSpPr txBox="1"/>
+          <p:nvPr/>
+        </p:nvSpPr>
+        <p:spPr>
+          <a:xfrm>
+            <a:off x="3436513" y="274611"/>
+            <a:ext cx="1066318" cy="369332"/>
+          </a:xfrm>
+          <a:prstGeom prst="rect">
+            <a:avLst/>
+          </a:prstGeom>
+          <a:noFill/>
+        </p:spPr>
+        <p:txBody>
+          <a:bodyPr wrap="none" rtlCol="0">
+            <a:spAutoFit/>
+          </a:bodyPr>
+          <a:lstStyle/>
+          <a:p>
+            <a:r>
+              <a:rPr lang="es-CL" dirty="0" err="1" smtClean="0"/>
+              <a:t>Seleccion</a:t>
+            </a:r>
+            <a:endParaRPr lang="es-CL" dirty="0" smtClean="0"/>
+          </a:p>
+        </p:txBody>
+      </p:sp>
+      <p:sp>
+        <p:nvSpPr>
+          <p:cNvPr id="10" name="Rectángulo 9"/>
+          <p:cNvSpPr/>
+          <p:nvPr/>
+        </p:nvSpPr>
+        <p:spPr>
+          <a:xfrm>
+            <a:off x="3421630" y="1749380"/>
+            <a:ext cx="2653048" cy="940158"/>
+          </a:xfrm>
+          <a:prstGeom prst="rect">
+            <a:avLst/>
+          </a:prstGeom>
+        </p:spPr>
+        <p:style>
+          <a:lnRef idx="2">
+            <a:schemeClr val="accent1">
+              <a:shade val="50000"/>
+            </a:schemeClr>
+          </a:lnRef>
+          <a:fillRef idx="1">
+            <a:schemeClr val="accent1"/>
+          </a:fillRef>
+          <a:effectRef idx="0">
+            <a:schemeClr val="accent1"/>
+          </a:effectRef>
+          <a:fontRef idx="minor">
+            <a:schemeClr val="lt1"/>
+          </a:fontRef>
+        </p:style>
+        <p:txBody>
+          <a:bodyPr rtlCol="0" anchor="ctr"/>
+          <a:lstStyle/>
+          <a:p>
+            <a:pPr algn="ctr"/>
+            <a:r>
+              <a:rPr lang="es-CL" b="1" dirty="0" smtClean="0">
+                <a:solidFill>
+                  <a:srgbClr val="C00000"/>
+                </a:solidFill>
+              </a:rPr>
+              <a:t>Selector de sujeto</a:t>
+            </a:r>
+          </a:p>
+          <a:p>
+            <a:pPr algn="ctr"/>
+            <a:r>
+              <a:rPr lang="es-CL" dirty="0" err="1" smtClean="0"/>
+              <a:t>selectInput</a:t>
+            </a:r>
+            <a:endParaRPr lang="es-CL" dirty="0" smtClean="0"/>
+          </a:p>
+          <a:p>
+            <a:pPr algn="ctr"/>
+            <a:r>
+              <a:rPr lang="es-CL" sz="1600" dirty="0" err="1" smtClean="0">
+                <a:solidFill>
+                  <a:schemeClr val="tx1"/>
+                </a:solidFill>
+                <a:latin typeface="Courier New" panose="02070309020205020404" pitchFamily="49" charset="0"/>
+                <a:cs typeface="Courier New" panose="02070309020205020404" pitchFamily="49" charset="0"/>
+              </a:rPr>
+              <a:t>input$awd_select</a:t>
+            </a:r>
+            <a:endParaRPr lang="es-419" sz="1600" dirty="0">
+              <a:solidFill>
+                <a:schemeClr val="tx1"/>
+              </a:solidFill>
+              <a:latin typeface="Courier New" panose="02070309020205020404" pitchFamily="49" charset="0"/>
+              <a:cs typeface="Courier New" panose="02070309020205020404" pitchFamily="49" charset="0"/>
+            </a:endParaRPr>
+          </a:p>
+        </p:txBody>
+      </p:sp>
+    </p:spTree>
+    <p:extLst>
+      <p:ext uri="{BB962C8B-B14F-4D97-AF65-F5344CB8AC3E}">
+        <p14:creationId xmlns:p14="http://schemas.microsoft.com/office/powerpoint/2010/main" val="1142184872"/>
       </p:ext>
     </p:extLst>
   </p:cSld>

</xml_diff>

<commit_message>
retoques varios y lectura filter file
</commit_message>
<xml_diff>
--- a/flujo edicion.pptx
+++ b/flujo edicion.pptx
@@ -252,7 +252,7 @@
           <a:p>
             <a:fld id="{E142A079-F624-4F06-8292-7991D53C206B}" type="datetimeFigureOut">
               <a:rPr lang="es-419" smtClean="0"/>
-              <a:t>27/1/2020</a:t>
+              <a:t>29/1/2020</a:t>
             </a:fld>
             <a:endParaRPr lang="es-419"/>
           </a:p>
@@ -422,7 +422,7 @@
           <a:p>
             <a:fld id="{E142A079-F624-4F06-8292-7991D53C206B}" type="datetimeFigureOut">
               <a:rPr lang="es-419" smtClean="0"/>
-              <a:t>27/1/2020</a:t>
+              <a:t>29/1/2020</a:t>
             </a:fld>
             <a:endParaRPr lang="es-419"/>
           </a:p>
@@ -602,7 +602,7 @@
           <a:p>
             <a:fld id="{E142A079-F624-4F06-8292-7991D53C206B}" type="datetimeFigureOut">
               <a:rPr lang="es-419" smtClean="0"/>
-              <a:t>27/1/2020</a:t>
+              <a:t>29/1/2020</a:t>
             </a:fld>
             <a:endParaRPr lang="es-419"/>
           </a:p>
@@ -772,7 +772,7 @@
           <a:p>
             <a:fld id="{E142A079-F624-4F06-8292-7991D53C206B}" type="datetimeFigureOut">
               <a:rPr lang="es-419" smtClean="0"/>
-              <a:t>27/1/2020</a:t>
+              <a:t>29/1/2020</a:t>
             </a:fld>
             <a:endParaRPr lang="es-419"/>
           </a:p>
@@ -1018,7 +1018,7 @@
           <a:p>
             <a:fld id="{E142A079-F624-4F06-8292-7991D53C206B}" type="datetimeFigureOut">
               <a:rPr lang="es-419" smtClean="0"/>
-              <a:t>27/1/2020</a:t>
+              <a:t>29/1/2020</a:t>
             </a:fld>
             <a:endParaRPr lang="es-419"/>
           </a:p>
@@ -1250,7 +1250,7 @@
           <a:p>
             <a:fld id="{E142A079-F624-4F06-8292-7991D53C206B}" type="datetimeFigureOut">
               <a:rPr lang="es-419" smtClean="0"/>
-              <a:t>27/1/2020</a:t>
+              <a:t>29/1/2020</a:t>
             </a:fld>
             <a:endParaRPr lang="es-419"/>
           </a:p>
@@ -1617,7 +1617,7 @@
           <a:p>
             <a:fld id="{E142A079-F624-4F06-8292-7991D53C206B}" type="datetimeFigureOut">
               <a:rPr lang="es-419" smtClean="0"/>
-              <a:t>27/1/2020</a:t>
+              <a:t>29/1/2020</a:t>
             </a:fld>
             <a:endParaRPr lang="es-419"/>
           </a:p>
@@ -1735,7 +1735,7 @@
           <a:p>
             <a:fld id="{E142A079-F624-4F06-8292-7991D53C206B}" type="datetimeFigureOut">
               <a:rPr lang="es-419" smtClean="0"/>
-              <a:t>27/1/2020</a:t>
+              <a:t>29/1/2020</a:t>
             </a:fld>
             <a:endParaRPr lang="es-419"/>
           </a:p>
@@ -1830,7 +1830,7 @@
           <a:p>
             <a:fld id="{E142A079-F624-4F06-8292-7991D53C206B}" type="datetimeFigureOut">
               <a:rPr lang="es-419" smtClean="0"/>
-              <a:t>27/1/2020</a:t>
+              <a:t>29/1/2020</a:t>
             </a:fld>
             <a:endParaRPr lang="es-419"/>
           </a:p>
@@ -2107,7 +2107,7 @@
           <a:p>
             <a:fld id="{E142A079-F624-4F06-8292-7991D53C206B}" type="datetimeFigureOut">
               <a:rPr lang="es-419" smtClean="0"/>
-              <a:t>27/1/2020</a:t>
+              <a:t>29/1/2020</a:t>
             </a:fld>
             <a:endParaRPr lang="es-419"/>
           </a:p>
@@ -2360,7 +2360,7 @@
           <a:p>
             <a:fld id="{E142A079-F624-4F06-8292-7991D53C206B}" type="datetimeFigureOut">
               <a:rPr lang="es-419" smtClean="0"/>
-              <a:t>27/1/2020</a:t>
+              <a:t>29/1/2020</a:t>
             </a:fld>
             <a:endParaRPr lang="es-419"/>
           </a:p>
@@ -2573,7 +2573,7 @@
           <a:p>
             <a:fld id="{E142A079-F624-4F06-8292-7991D53C206B}" type="datetimeFigureOut">
               <a:rPr lang="es-419" smtClean="0"/>
-              <a:t>27/1/2020</a:t>
+              <a:t>29/1/2020</a:t>
             </a:fld>
             <a:endParaRPr lang="es-419"/>
           </a:p>
@@ -3381,11 +3381,7 @@
             </a:r>
             <a:r>
               <a:rPr lang="es-CL" dirty="0" smtClean="0"/>
-              <a:t>(lista</a:t>
-            </a:r>
-            <a:r>
-              <a:rPr lang="es-CL" dirty="0" smtClean="0"/>
-              <a:t>)</a:t>
+              <a:t>(lista)</a:t>
             </a:r>
             <a:endParaRPr lang="es-419" dirty="0"/>
           </a:p>
@@ -4446,8 +4442,8 @@
               <a:t>el </a:t>
             </a:r>
             <a:r>
-              <a:rPr lang="es-CL" dirty="0" err="1" smtClean="0"/>
-              <a:t>txt</a:t>
+              <a:rPr lang="es-CL" dirty="0" smtClean="0"/>
+              <a:t>RDS</a:t>
             </a:r>
             <a:endParaRPr lang="es-CL" dirty="0" smtClean="0"/>
           </a:p>
@@ -9669,7 +9665,7 @@
             </a:r>
             <a:r>
               <a:rPr lang="es-CL" dirty="0" err="1" smtClean="0"/>
-              <a:t>txt</a:t>
+              <a:t>rds</a:t>
             </a:r>
             <a:r>
               <a:rPr lang="es-CL" dirty="0" smtClean="0"/>
@@ -9724,8 +9720,16 @@
           <a:p>
             <a:pPr algn="ctr"/>
             <a:r>
-              <a:rPr lang="es-CL" sz="1600" smtClean="0"/>
-              <a:t>(obj:df)</a:t>
+              <a:rPr lang="es-CL" sz="1600" dirty="0" smtClean="0"/>
+              <a:t>(</a:t>
+            </a:r>
+            <a:r>
+              <a:rPr lang="es-CL" sz="1600" dirty="0" err="1" smtClean="0"/>
+              <a:t>obj:list</a:t>
+            </a:r>
+            <a:r>
+              <a:rPr lang="es-CL" sz="1600" dirty="0" smtClean="0"/>
+              <a:t>)</a:t>
             </a:r>
             <a:endParaRPr lang="es-419" sz="1600" dirty="0"/>
           </a:p>
@@ -11528,8 +11532,13 @@
             </a:r>
             <a:r>
               <a:rPr lang="es-CL" sz="2400" b="1" dirty="0" smtClean="0"/>
-              <a:t>Proceso Analizar</a:t>
-            </a:r>
+              <a:t>Proceso </a:t>
+            </a:r>
+            <a:r>
+              <a:rPr lang="es-CL" sz="2400" b="1" dirty="0" err="1" smtClean="0"/>
+              <a:t>Actograma</a:t>
+            </a:r>
+            <a:endParaRPr lang="es-CL" sz="2400" b="1" dirty="0" smtClean="0"/>
           </a:p>
           <a:p>
             <a:r>

</xml_diff>

<commit_message>
funcionando ok hasta filtrar periodo
a vacas :)
feliz
</commit_message>
<xml_diff>
--- a/flujo edicion.pptx
+++ b/flujo edicion.pptx
@@ -14,7 +14,7 @@
     <p:sldId id="257" r:id="rId8"/>
     <p:sldId id="258" r:id="rId9"/>
     <p:sldId id="266" r:id="rId10"/>
-    <p:sldId id="256" r:id="rId11"/>
+    <p:sldId id="267" r:id="rId11"/>
   </p:sldIdLst>
   <p:sldSz cx="12192000" cy="6858000"/>
   <p:notesSz cx="6858000" cy="9144000"/>
@@ -252,7 +252,7 @@
           <a:p>
             <a:fld id="{E142A079-F624-4F06-8292-7991D53C206B}" type="datetimeFigureOut">
               <a:rPr lang="es-419" smtClean="0"/>
-              <a:t>29/1/2020</a:t>
+              <a:t>31/1/2020</a:t>
             </a:fld>
             <a:endParaRPr lang="es-419"/>
           </a:p>
@@ -422,7 +422,7 @@
           <a:p>
             <a:fld id="{E142A079-F624-4F06-8292-7991D53C206B}" type="datetimeFigureOut">
               <a:rPr lang="es-419" smtClean="0"/>
-              <a:t>29/1/2020</a:t>
+              <a:t>31/1/2020</a:t>
             </a:fld>
             <a:endParaRPr lang="es-419"/>
           </a:p>
@@ -602,7 +602,7 @@
           <a:p>
             <a:fld id="{E142A079-F624-4F06-8292-7991D53C206B}" type="datetimeFigureOut">
               <a:rPr lang="es-419" smtClean="0"/>
-              <a:t>29/1/2020</a:t>
+              <a:t>31/1/2020</a:t>
             </a:fld>
             <a:endParaRPr lang="es-419"/>
           </a:p>
@@ -772,7 +772,7 @@
           <a:p>
             <a:fld id="{E142A079-F624-4F06-8292-7991D53C206B}" type="datetimeFigureOut">
               <a:rPr lang="es-419" smtClean="0"/>
-              <a:t>29/1/2020</a:t>
+              <a:t>31/1/2020</a:t>
             </a:fld>
             <a:endParaRPr lang="es-419"/>
           </a:p>
@@ -1018,7 +1018,7 @@
           <a:p>
             <a:fld id="{E142A079-F624-4F06-8292-7991D53C206B}" type="datetimeFigureOut">
               <a:rPr lang="es-419" smtClean="0"/>
-              <a:t>29/1/2020</a:t>
+              <a:t>31/1/2020</a:t>
             </a:fld>
             <a:endParaRPr lang="es-419"/>
           </a:p>
@@ -1250,7 +1250,7 @@
           <a:p>
             <a:fld id="{E142A079-F624-4F06-8292-7991D53C206B}" type="datetimeFigureOut">
               <a:rPr lang="es-419" smtClean="0"/>
-              <a:t>29/1/2020</a:t>
+              <a:t>31/1/2020</a:t>
             </a:fld>
             <a:endParaRPr lang="es-419"/>
           </a:p>
@@ -1617,7 +1617,7 @@
           <a:p>
             <a:fld id="{E142A079-F624-4F06-8292-7991D53C206B}" type="datetimeFigureOut">
               <a:rPr lang="es-419" smtClean="0"/>
-              <a:t>29/1/2020</a:t>
+              <a:t>31/1/2020</a:t>
             </a:fld>
             <a:endParaRPr lang="es-419"/>
           </a:p>
@@ -1735,7 +1735,7 @@
           <a:p>
             <a:fld id="{E142A079-F624-4F06-8292-7991D53C206B}" type="datetimeFigureOut">
               <a:rPr lang="es-419" smtClean="0"/>
-              <a:t>29/1/2020</a:t>
+              <a:t>31/1/2020</a:t>
             </a:fld>
             <a:endParaRPr lang="es-419"/>
           </a:p>
@@ -1830,7 +1830,7 @@
           <a:p>
             <a:fld id="{E142A079-F624-4F06-8292-7991D53C206B}" type="datetimeFigureOut">
               <a:rPr lang="es-419" smtClean="0"/>
-              <a:t>29/1/2020</a:t>
+              <a:t>31/1/2020</a:t>
             </a:fld>
             <a:endParaRPr lang="es-419"/>
           </a:p>
@@ -2107,7 +2107,7 @@
           <a:p>
             <a:fld id="{E142A079-F624-4F06-8292-7991D53C206B}" type="datetimeFigureOut">
               <a:rPr lang="es-419" smtClean="0"/>
-              <a:t>29/1/2020</a:t>
+              <a:t>31/1/2020</a:t>
             </a:fld>
             <a:endParaRPr lang="es-419"/>
           </a:p>
@@ -2360,7 +2360,7 @@
           <a:p>
             <a:fld id="{E142A079-F624-4F06-8292-7991D53C206B}" type="datetimeFigureOut">
               <a:rPr lang="es-419" smtClean="0"/>
-              <a:t>29/1/2020</a:t>
+              <a:t>31/1/2020</a:t>
             </a:fld>
             <a:endParaRPr lang="es-419"/>
           </a:p>
@@ -2573,7 +2573,7 @@
           <a:p>
             <a:fld id="{E142A079-F624-4F06-8292-7991D53C206B}" type="datetimeFigureOut">
               <a:rPr lang="es-419" smtClean="0"/>
-              <a:t>29/1/2020</a:t>
+              <a:t>31/1/2020</a:t>
             </a:fld>
             <a:endParaRPr lang="es-419"/>
           </a:p>
@@ -3053,111 +3053,42 @@
           <a:chExt cx="0" cy="0"/>
         </a:xfrm>
       </p:grpSpPr>
-      <p:sp>
-        <p:nvSpPr>
-          <p:cNvPr id="78" name="Rectángulo 77"/>
-          <p:cNvSpPr/>
-          <p:nvPr/>
-        </p:nvSpPr>
-        <p:spPr>
-          <a:xfrm>
-            <a:off x="360608" y="3230508"/>
-            <a:ext cx="3000777" cy="1284814"/>
-          </a:xfrm>
-          <a:prstGeom prst="rect">
-            <a:avLst/>
-          </a:prstGeom>
-          <a:solidFill>
-            <a:schemeClr val="accent3">
-              <a:alpha val="42000"/>
-            </a:schemeClr>
-          </a:solidFill>
-        </p:spPr>
-        <p:style>
-          <a:lnRef idx="2">
-            <a:schemeClr val="accent3">
-              <a:shade val="50000"/>
-            </a:schemeClr>
-          </a:lnRef>
-          <a:fillRef idx="1">
-            <a:schemeClr val="accent3"/>
-          </a:fillRef>
-          <a:effectRef idx="0">
-            <a:schemeClr val="accent3"/>
-          </a:effectRef>
-          <a:fontRef idx="minor">
-            <a:schemeClr val="lt1"/>
-          </a:fontRef>
-        </p:style>
-        <p:txBody>
-          <a:bodyPr rtlCol="0" anchor="ctr"/>
-          <a:lstStyle/>
-          <a:p>
-            <a:pPr algn="ctr"/>
-            <a:endParaRPr lang="es-419"/>
-          </a:p>
-        </p:txBody>
-      </p:sp>
-      <p:sp>
-        <p:nvSpPr>
-          <p:cNvPr id="8" name="Rectángulo 7"/>
-          <p:cNvSpPr/>
-          <p:nvPr/>
-        </p:nvSpPr>
-        <p:spPr>
-          <a:xfrm>
-            <a:off x="4483235" y="1724101"/>
-            <a:ext cx="1043188" cy="576000"/>
-          </a:xfrm>
-          <a:prstGeom prst="rect">
-            <a:avLst/>
-          </a:prstGeom>
-        </p:spPr>
-        <p:style>
-          <a:lnRef idx="2">
-            <a:schemeClr val="accent1">
-              <a:shade val="50000"/>
-            </a:schemeClr>
-          </a:lnRef>
-          <a:fillRef idx="1">
-            <a:schemeClr val="accent1"/>
-          </a:fillRef>
-          <a:effectRef idx="0">
-            <a:schemeClr val="accent1"/>
-          </a:effectRef>
-          <a:fontRef idx="minor">
-            <a:schemeClr val="lt1"/>
-          </a:fontRef>
-        </p:style>
-        <p:txBody>
-          <a:bodyPr rtlCol="0" anchor="ctr"/>
-          <a:lstStyle/>
-          <a:p>
-            <a:pPr algn="ctr"/>
-            <a:r>
-              <a:rPr lang="es-CL" dirty="0" err="1" smtClean="0"/>
-              <a:t>semiper</a:t>
-            </a:r>
-            <a:endParaRPr lang="es-CL" dirty="0" smtClean="0"/>
-          </a:p>
-          <a:p>
-            <a:pPr algn="ctr"/>
-            <a:r>
-              <a:rPr lang="es-CL" dirty="0" smtClean="0"/>
-              <a:t>(</a:t>
-            </a:r>
-            <a:r>
-              <a:rPr lang="es-CL" dirty="0" err="1" smtClean="0"/>
-              <a:t>obj</a:t>
-            </a:r>
-            <a:r>
-              <a:rPr lang="es-CL" dirty="0" smtClean="0"/>
-              <a:t>)z</a:t>
-            </a:r>
-            <a:endParaRPr lang="es-419" dirty="0"/>
-          </a:p>
-        </p:txBody>
-      </p:sp>
+      <p:cxnSp>
+        <p:nvCxnSpPr>
+          <p:cNvPr id="97" name="Conector angular 96"/>
+          <p:cNvCxnSpPr>
+            <a:stCxn id="85" idx="1"/>
+            <a:endCxn id="47" idx="2"/>
+          </p:cNvCxnSpPr>
+          <p:nvPr/>
+        </p:nvCxnSpPr>
+        <p:spPr>
+          <a:xfrm rot="10800000">
+            <a:off x="1707074" y="2497241"/>
+            <a:ext cx="8241093" cy="3609079"/>
+          </a:xfrm>
+          <a:prstGeom prst="bentConnector2">
+            <a:avLst/>
+          </a:prstGeom>
+          <a:ln w="38100">
+            <a:tailEnd type="triangle"/>
+          </a:ln>
+        </p:spPr>
+        <p:style>
+          <a:lnRef idx="1">
+            <a:schemeClr val="accent1"/>
+          </a:lnRef>
+          <a:fillRef idx="0">
+            <a:schemeClr val="accent1"/>
+          </a:fillRef>
+          <a:effectRef idx="0">
+            <a:schemeClr val="accent1"/>
+          </a:effectRef>
+          <a:fontRef idx="minor">
+            <a:schemeClr val="tx1"/>
+          </a:fontRef>
+        </p:style>
+      </p:cxnSp>
       <p:sp>
         <p:nvSpPr>
           <p:cNvPr id="33" name="Datos 32"/>
@@ -3166,8 +3097,8 @@
         </p:nvSpPr>
         <p:spPr>
           <a:xfrm>
-            <a:off x="7320769" y="1327114"/>
-            <a:ext cx="1634742" cy="576000"/>
+            <a:off x="8193898" y="1517253"/>
+            <a:ext cx="2178719" cy="1400030"/>
           </a:xfrm>
           <a:prstGeom prst="flowChartInputOutput">
             <a:avLst/>
@@ -3193,17 +3124,33 @@
           <a:bodyPr rtlCol="0" anchor="ctr"/>
           <a:lstStyle/>
           <a:p>
-            <a:pPr algn="ctr"/>
             <a:r>
               <a:rPr lang="es-CL" sz="1600" dirty="0" smtClean="0"/>
-              <a:t>editar</a:t>
-            </a:r>
-          </a:p>
-          <a:p>
-            <a:pPr algn="ctr"/>
+              <a:t>Edición</a:t>
+            </a:r>
+          </a:p>
+          <a:p>
             <a:r>
               <a:rPr lang="es-CL" sz="1600" dirty="0" smtClean="0"/>
-              <a:t>actividad</a:t>
+              <a:t>- Periodo</a:t>
+            </a:r>
+          </a:p>
+          <a:p>
+            <a:r>
+              <a:rPr lang="es-CL" sz="1600" dirty="0" smtClean="0"/>
+              <a:t>- Actividad</a:t>
+            </a:r>
+          </a:p>
+          <a:p>
+            <a:r>
+              <a:rPr lang="es-CL" sz="1600" dirty="0" smtClean="0"/>
+              <a:t>- Noche</a:t>
+            </a:r>
+          </a:p>
+          <a:p>
+            <a:r>
+              <a:rPr lang="es-CL" sz="1600" dirty="0" smtClean="0"/>
+              <a:t>- Borra filtro</a:t>
             </a:r>
             <a:endParaRPr lang="es-419" sz="1600" dirty="0"/>
           </a:p>
@@ -3217,8 +3164,8 @@
         </p:nvSpPr>
         <p:spPr>
           <a:xfrm>
-            <a:off x="180304" y="5297834"/>
-            <a:ext cx="4726662" cy="1384995"/>
+            <a:off x="2965320" y="4481371"/>
+            <a:ext cx="5032460" cy="1384995"/>
           </a:xfrm>
           <a:prstGeom prst="rect">
             <a:avLst/>
@@ -3247,7 +3194,7 @@
                 </a:solidFill>
                 <a:latin typeface="Consolas" panose="020B0609020204030204" pitchFamily="49" charset="0"/>
               </a:rPr>
-              <a:t>tosleep</a:t>
+              <a:t>ininoc</a:t>
             </a:r>
             <a:r>
               <a:rPr lang="es-CL" sz="1400" b="1" dirty="0" smtClean="0">
@@ -3258,8 +3205,38 @@
                 </a:solidFill>
                 <a:latin typeface="Consolas" panose="020B0609020204030204" pitchFamily="49" charset="0"/>
               </a:rPr>
-              <a:t>: 12/05/2011 20:00 – 12/05/2011 20:15</a:t>
-            </a:r>
+              <a:t>:  12/05/2011 </a:t>
+            </a:r>
+            <a:r>
+              <a:rPr lang="es-CL" sz="1400" b="1" dirty="0" smtClean="0">
+                <a:solidFill>
+                  <a:schemeClr val="accent5">
+                    <a:lumMod val="75000"/>
+                  </a:schemeClr>
+                </a:solidFill>
+                <a:latin typeface="Consolas" panose="020B0609020204030204" pitchFamily="49" charset="0"/>
+              </a:rPr>
+              <a:t>20:00 – 12/05/2011 </a:t>
+            </a:r>
+            <a:r>
+              <a:rPr lang="es-CL" sz="1400" b="1" dirty="0" smtClean="0">
+                <a:solidFill>
+                  <a:schemeClr val="accent5">
+                    <a:lumMod val="75000"/>
+                  </a:schemeClr>
+                </a:solidFill>
+                <a:latin typeface="Consolas" panose="020B0609020204030204" pitchFamily="49" charset="0"/>
+              </a:rPr>
+              <a:t>20:15 = 3</a:t>
+            </a:r>
+            <a:endParaRPr lang="es-CL" sz="1400" b="1" dirty="0" smtClean="0">
+              <a:solidFill>
+                <a:schemeClr val="accent5">
+                  <a:lumMod val="75000"/>
+                </a:schemeClr>
+              </a:solidFill>
+              <a:latin typeface="Consolas" panose="020B0609020204030204" pitchFamily="49" charset="0"/>
+            </a:endParaRPr>
           </a:p>
           <a:p>
             <a:r>
@@ -3282,8 +3259,27 @@
                 </a:solidFill>
                 <a:latin typeface="Consolas" panose="020B0609020204030204" pitchFamily="49" charset="0"/>
               </a:rPr>
-              <a:t>: 12/05/2011 20:00 – 13/05/2011 20:15</a:t>
-            </a:r>
+              <a:t>: 12/05/2011 20:00 – 13/05/2011 </a:t>
+            </a:r>
+            <a:r>
+              <a:rPr lang="es-CL" sz="1400" b="1" dirty="0" smtClean="0">
+                <a:solidFill>
+                  <a:schemeClr val="accent4">
+                    <a:lumMod val="50000"/>
+                  </a:schemeClr>
+                </a:solidFill>
+                <a:latin typeface="Consolas" panose="020B0609020204030204" pitchFamily="49" charset="0"/>
+              </a:rPr>
+              <a:t>20:15 = 2</a:t>
+            </a:r>
+            <a:endParaRPr lang="es-CL" sz="1400" b="1" dirty="0" smtClean="0">
+              <a:solidFill>
+                <a:schemeClr val="accent4">
+                  <a:lumMod val="50000"/>
+                </a:schemeClr>
+              </a:solidFill>
+              <a:latin typeface="Consolas" panose="020B0609020204030204" pitchFamily="49" charset="0"/>
+            </a:endParaRPr>
           </a:p>
           <a:p>
             <a:endParaRPr lang="es-CL" sz="1400" b="1" dirty="0">
@@ -3319,7 +3315,7 @@
                 </a:solidFill>
                 <a:latin typeface="Consolas" panose="020B0609020204030204" pitchFamily="49" charset="0"/>
               </a:rPr>
-              <a:t>: 12/05/2011 20:00 – 13/05/2011 </a:t>
+              <a:t>: </a:t>
             </a:r>
             <a:r>
               <a:rPr lang="es-CL" sz="1400" b="1" dirty="0" smtClean="0">
@@ -3328,7 +3324,25 @@
                 </a:solidFill>
                 <a:latin typeface="Consolas" panose="020B0609020204030204" pitchFamily="49" charset="0"/>
               </a:rPr>
-              <a:t>06:00</a:t>
+              <a:t> 12/05/2011 </a:t>
+            </a:r>
+            <a:r>
+              <a:rPr lang="es-CL" sz="1400" b="1" dirty="0">
+                <a:solidFill>
+                  <a:srgbClr val="C00000"/>
+                </a:solidFill>
+                <a:latin typeface="Consolas" panose="020B0609020204030204" pitchFamily="49" charset="0"/>
+              </a:rPr>
+              <a:t>20:00 – 13/05/2011 </a:t>
+            </a:r>
+            <a:r>
+              <a:rPr lang="es-CL" sz="1400" b="1" dirty="0" smtClean="0">
+                <a:solidFill>
+                  <a:srgbClr val="C00000"/>
+                </a:solidFill>
+                <a:latin typeface="Consolas" panose="020B0609020204030204" pitchFamily="49" charset="0"/>
+              </a:rPr>
+              <a:t>06:00 = 1</a:t>
             </a:r>
             <a:endParaRPr lang="es-419" sz="1400" b="1" dirty="0">
               <a:solidFill>
@@ -3341,14 +3355,524 @@
       </p:sp>
       <p:sp>
         <p:nvSpPr>
-          <p:cNvPr id="45" name="Rectángulo 44"/>
+          <p:cNvPr id="46" name="CuadroTexto 45"/>
+          <p:cNvSpPr txBox="1"/>
+          <p:nvPr/>
+        </p:nvSpPr>
+        <p:spPr>
+          <a:xfrm>
+            <a:off x="180304" y="180304"/>
+            <a:ext cx="11552350" cy="892552"/>
+          </a:xfrm>
+          <a:prstGeom prst="rect">
+            <a:avLst/>
+          </a:prstGeom>
+          <a:noFill/>
+        </p:spPr>
+        <p:txBody>
+          <a:bodyPr wrap="square" rtlCol="0">
+            <a:spAutoFit/>
+          </a:bodyPr>
+          <a:lstStyle/>
+          <a:p>
+            <a:r>
+              <a:rPr lang="es-CL" sz="2400" b="1" dirty="0" err="1" smtClean="0"/>
+              <a:t>Seccion</a:t>
+            </a:r>
+            <a:r>
+              <a:rPr lang="es-CL" sz="2400" b="1" dirty="0" smtClean="0"/>
+              <a:t> 3</a:t>
+            </a:r>
+            <a:r>
+              <a:rPr lang="es-CL" sz="2400" dirty="0" smtClean="0"/>
+              <a:t>: </a:t>
+            </a:r>
+            <a:r>
+              <a:rPr lang="es-CL" sz="2400" b="1" dirty="0" smtClean="0"/>
+              <a:t>Proceso </a:t>
+            </a:r>
+            <a:r>
+              <a:rPr lang="es-CL" sz="2400" b="1" dirty="0" smtClean="0"/>
+              <a:t>Editar</a:t>
+            </a:r>
+          </a:p>
+          <a:p>
+            <a:r>
+              <a:rPr lang="es-CL" sz="1400" dirty="0" smtClean="0"/>
+              <a:t>Al seleccionar o existir un </a:t>
+            </a:r>
+            <a:r>
+              <a:rPr lang="es-CL" sz="1400" b="1" dirty="0" err="1" smtClean="0"/>
+              <a:t>awdfile</a:t>
+            </a:r>
+            <a:r>
+              <a:rPr lang="es-CL" sz="1400" dirty="0" smtClean="0"/>
+              <a:t>() se carga el </a:t>
+            </a:r>
+            <a:r>
+              <a:rPr lang="es-CL" sz="1400" dirty="0"/>
+              <a:t>correspondiente </a:t>
+            </a:r>
+            <a:r>
+              <a:rPr lang="es-CL" sz="1400" b="1" dirty="0" err="1" smtClean="0"/>
+              <a:t>acveditRDS</a:t>
+            </a:r>
+            <a:r>
+              <a:rPr lang="es-CL" sz="1400" dirty="0" smtClean="0"/>
+              <a:t>()</a:t>
+            </a:r>
+            <a:r>
+              <a:rPr lang="es-CL" sz="1400" dirty="0"/>
+              <a:t> y el </a:t>
+            </a:r>
+            <a:r>
+              <a:rPr lang="es-CL" sz="1400" b="1" dirty="0" err="1" smtClean="0"/>
+              <a:t>filterRDS</a:t>
+            </a:r>
+            <a:r>
+              <a:rPr lang="es-CL" sz="1400" dirty="0" smtClean="0"/>
+              <a:t>() los cuales están en un </a:t>
+            </a:r>
+            <a:r>
+              <a:rPr lang="es-CL" sz="1400" b="1" dirty="0" err="1" smtClean="0"/>
+              <a:t>reactivePoll</a:t>
+            </a:r>
+            <a:r>
+              <a:rPr lang="es-CL" sz="1400" dirty="0" smtClean="0"/>
+              <a:t> que chequea cada ½ segundo si hay cambios en la fecha de modificación. Entonces el cambio o edición depende de modificar el archivo.</a:t>
+            </a:r>
+            <a:endParaRPr lang="es-CL" sz="1400" dirty="0" smtClean="0"/>
+          </a:p>
+        </p:txBody>
+      </p:sp>
+      <p:sp>
+        <p:nvSpPr>
+          <p:cNvPr id="47" name="Rectángulo 46"/>
           <p:cNvSpPr/>
           <p:nvPr/>
         </p:nvSpPr>
         <p:spPr>
           <a:xfrm>
-            <a:off x="2635114" y="1724101"/>
-            <a:ext cx="1345845" cy="576000"/>
+            <a:off x="897515" y="1921240"/>
+            <a:ext cx="1619115" cy="576000"/>
+          </a:xfrm>
+          <a:prstGeom prst="rect">
+            <a:avLst/>
+          </a:prstGeom>
+        </p:spPr>
+        <p:style>
+          <a:lnRef idx="2">
+            <a:schemeClr val="accent4">
+              <a:shade val="50000"/>
+            </a:schemeClr>
+          </a:lnRef>
+          <a:fillRef idx="1">
+            <a:schemeClr val="accent4"/>
+          </a:fillRef>
+          <a:effectRef idx="0">
+            <a:schemeClr val="accent4"/>
+          </a:effectRef>
+          <a:fontRef idx="minor">
+            <a:schemeClr val="lt1"/>
+          </a:fontRef>
+        </p:style>
+        <p:txBody>
+          <a:bodyPr rtlCol="0" anchor="ctr"/>
+          <a:lstStyle/>
+          <a:p>
+            <a:pPr algn="ctr"/>
+            <a:r>
+              <a:rPr lang="es-CL" sz="1600" dirty="0">
+                <a:solidFill>
+                  <a:schemeClr val="accent1">
+                    <a:lumMod val="50000"/>
+                  </a:schemeClr>
+                </a:solidFill>
+              </a:rPr>
+              <a:t>"_</a:t>
+            </a:r>
+            <a:r>
+              <a:rPr lang="es-CL" sz="1600" dirty="0" err="1">
+                <a:solidFill>
+                  <a:schemeClr val="accent1">
+                    <a:lumMod val="50000"/>
+                  </a:schemeClr>
+                </a:solidFill>
+              </a:rPr>
+              <a:t>acv.edit.RDS</a:t>
+            </a:r>
+            <a:r>
+              <a:rPr lang="es-CL" sz="1600" dirty="0">
+                <a:solidFill>
+                  <a:schemeClr val="accent1">
+                    <a:lumMod val="50000"/>
+                  </a:schemeClr>
+                </a:solidFill>
+              </a:rPr>
+              <a:t>"</a:t>
+            </a:r>
+            <a:endParaRPr lang="es-419" sz="1600" dirty="0">
+              <a:solidFill>
+                <a:schemeClr val="accent1">
+                  <a:lumMod val="50000"/>
+                </a:schemeClr>
+              </a:solidFill>
+            </a:endParaRPr>
+          </a:p>
+        </p:txBody>
+      </p:sp>
+      <p:sp>
+        <p:nvSpPr>
+          <p:cNvPr id="51" name="Rectángulo 50"/>
+          <p:cNvSpPr/>
+          <p:nvPr/>
+        </p:nvSpPr>
+        <p:spPr>
+          <a:xfrm>
+            <a:off x="897515" y="3248222"/>
+            <a:ext cx="1619114" cy="576000"/>
+          </a:xfrm>
+          <a:prstGeom prst="rect">
+            <a:avLst/>
+          </a:prstGeom>
+        </p:spPr>
+        <p:style>
+          <a:lnRef idx="2">
+            <a:schemeClr val="accent4">
+              <a:shade val="50000"/>
+            </a:schemeClr>
+          </a:lnRef>
+          <a:fillRef idx="1">
+            <a:schemeClr val="accent4"/>
+          </a:fillRef>
+          <a:effectRef idx="0">
+            <a:schemeClr val="accent4"/>
+          </a:effectRef>
+          <a:fontRef idx="minor">
+            <a:schemeClr val="lt1"/>
+          </a:fontRef>
+        </p:style>
+        <p:txBody>
+          <a:bodyPr rtlCol="0" anchor="ctr"/>
+          <a:lstStyle/>
+          <a:p>
+            <a:pPr algn="ctr"/>
+            <a:r>
+              <a:rPr lang="es-CL" sz="1600" dirty="0">
+                <a:solidFill>
+                  <a:schemeClr val="accent1">
+                    <a:lumMod val="50000"/>
+                  </a:schemeClr>
+                </a:solidFill>
+              </a:rPr>
+              <a:t>".</a:t>
+            </a:r>
+            <a:r>
+              <a:rPr lang="es-CL" sz="1600" dirty="0" err="1">
+                <a:solidFill>
+                  <a:schemeClr val="accent1">
+                    <a:lumMod val="50000"/>
+                  </a:schemeClr>
+                </a:solidFill>
+              </a:rPr>
+              <a:t>edit.RDS</a:t>
+            </a:r>
+            <a:r>
+              <a:rPr lang="es-CL" sz="1600" dirty="0">
+                <a:solidFill>
+                  <a:schemeClr val="accent1">
+                    <a:lumMod val="50000"/>
+                  </a:schemeClr>
+                </a:solidFill>
+              </a:rPr>
+              <a:t>"</a:t>
+            </a:r>
+            <a:endParaRPr lang="es-419" sz="1600" dirty="0">
+              <a:solidFill>
+                <a:schemeClr val="accent1">
+                  <a:lumMod val="50000"/>
+                </a:schemeClr>
+              </a:solidFill>
+            </a:endParaRPr>
+          </a:p>
+        </p:txBody>
+      </p:sp>
+      <p:sp>
+        <p:nvSpPr>
+          <p:cNvPr id="52" name="Rectángulo redondeado 51"/>
+          <p:cNvSpPr/>
+          <p:nvPr/>
+        </p:nvSpPr>
+        <p:spPr>
+          <a:xfrm>
+            <a:off x="2965320" y="1921240"/>
+            <a:ext cx="1004552" cy="576000"/>
+          </a:xfrm>
+          <a:prstGeom prst="roundRect">
+            <a:avLst/>
+          </a:prstGeom>
+        </p:spPr>
+        <p:style>
+          <a:lnRef idx="2">
+            <a:schemeClr val="accent2">
+              <a:shade val="50000"/>
+            </a:schemeClr>
+          </a:lnRef>
+          <a:fillRef idx="1">
+            <a:schemeClr val="accent2"/>
+          </a:fillRef>
+          <a:effectRef idx="0">
+            <a:schemeClr val="accent2"/>
+          </a:effectRef>
+          <a:fontRef idx="minor">
+            <a:schemeClr val="lt1"/>
+          </a:fontRef>
+        </p:style>
+        <p:txBody>
+          <a:bodyPr rtlCol="0" anchor="ctr"/>
+          <a:lstStyle/>
+          <a:p>
+            <a:pPr algn="ctr"/>
+            <a:r>
+              <a:rPr lang="es-CL" dirty="0" err="1" smtClean="0"/>
+              <a:t>check</a:t>
+            </a:r>
+            <a:endParaRPr lang="es-CL" dirty="0" smtClean="0"/>
+          </a:p>
+          <a:p>
+            <a:pPr algn="ctr"/>
+            <a:r>
+              <a:rPr lang="es-CL" dirty="0" err="1" smtClean="0"/>
+              <a:t>acvfilter</a:t>
+            </a:r>
+            <a:endParaRPr lang="es-419" dirty="0"/>
+          </a:p>
+        </p:txBody>
+      </p:sp>
+      <p:sp>
+        <p:nvSpPr>
+          <p:cNvPr id="67" name="Rectángulo 66"/>
+          <p:cNvSpPr/>
+          <p:nvPr/>
+        </p:nvSpPr>
+        <p:spPr>
+          <a:xfrm>
+            <a:off x="9948166" y="3936942"/>
+            <a:ext cx="1133340" cy="576000"/>
+          </a:xfrm>
+          <a:prstGeom prst="rect">
+            <a:avLst/>
+          </a:prstGeom>
+        </p:spPr>
+        <p:style>
+          <a:lnRef idx="2">
+            <a:schemeClr val="accent5">
+              <a:shade val="50000"/>
+            </a:schemeClr>
+          </a:lnRef>
+          <a:fillRef idx="1">
+            <a:schemeClr val="accent5"/>
+          </a:fillRef>
+          <a:effectRef idx="0">
+            <a:schemeClr val="accent5"/>
+          </a:effectRef>
+          <a:fontRef idx="minor">
+            <a:schemeClr val="lt1"/>
+          </a:fontRef>
+        </p:style>
+        <p:txBody>
+          <a:bodyPr rtlCol="0" anchor="ctr"/>
+          <a:lstStyle/>
+          <a:p>
+            <a:pPr algn="ctr"/>
+            <a:r>
+              <a:rPr lang="es-CL" dirty="0" err="1" smtClean="0"/>
+              <a:t>Button</a:t>
+            </a:r>
+            <a:r>
+              <a:rPr lang="es-CL" dirty="0" smtClean="0"/>
+              <a:t> </a:t>
+            </a:r>
+          </a:p>
+          <a:p>
+            <a:pPr algn="ctr"/>
+            <a:r>
+              <a:rPr lang="es-CL" dirty="0" err="1" smtClean="0"/>
+              <a:t>Action</a:t>
+            </a:r>
+            <a:endParaRPr lang="es-419" dirty="0"/>
+          </a:p>
+        </p:txBody>
+      </p:sp>
+      <p:sp>
+        <p:nvSpPr>
+          <p:cNvPr id="74" name="Rectángulo redondeado 73"/>
+          <p:cNvSpPr/>
+          <p:nvPr/>
+        </p:nvSpPr>
+        <p:spPr>
+          <a:xfrm>
+            <a:off x="9948166" y="4977610"/>
+            <a:ext cx="1133340" cy="576000"/>
+          </a:xfrm>
+          <a:prstGeom prst="roundRect">
+            <a:avLst/>
+          </a:prstGeom>
+        </p:spPr>
+        <p:style>
+          <a:lnRef idx="2">
+            <a:schemeClr val="accent2">
+              <a:shade val="50000"/>
+            </a:schemeClr>
+          </a:lnRef>
+          <a:fillRef idx="1">
+            <a:schemeClr val="accent2"/>
+          </a:fillRef>
+          <a:effectRef idx="0">
+            <a:schemeClr val="accent2"/>
+          </a:effectRef>
+          <a:fontRef idx="minor">
+            <a:schemeClr val="lt1"/>
+          </a:fontRef>
+        </p:style>
+        <p:txBody>
+          <a:bodyPr rtlCol="0" anchor="ctr"/>
+          <a:lstStyle/>
+          <a:p>
+            <a:pPr algn="ctr"/>
+            <a:r>
+              <a:rPr lang="es-CL" dirty="0" err="1" smtClean="0"/>
+              <a:t>update</a:t>
+            </a:r>
+            <a:endParaRPr lang="es-CL" dirty="0" smtClean="0"/>
+          </a:p>
+          <a:p>
+            <a:pPr algn="ctr"/>
+            <a:r>
+              <a:rPr lang="es-CL" dirty="0" err="1" smtClean="0"/>
+              <a:t>filter</a:t>
+            </a:r>
+            <a:endParaRPr lang="es-419" dirty="0"/>
+          </a:p>
+        </p:txBody>
+      </p:sp>
+      <p:sp>
+        <p:nvSpPr>
+          <p:cNvPr id="75" name="Rectángulo 74"/>
+          <p:cNvSpPr/>
+          <p:nvPr/>
+        </p:nvSpPr>
+        <p:spPr>
+          <a:xfrm>
+            <a:off x="6287943" y="3257087"/>
+            <a:ext cx="1043188" cy="576000"/>
+          </a:xfrm>
+          <a:prstGeom prst="rect">
+            <a:avLst/>
+          </a:prstGeom>
+        </p:spPr>
+        <p:style>
+          <a:lnRef idx="2">
+            <a:schemeClr val="accent4">
+              <a:shade val="50000"/>
+            </a:schemeClr>
+          </a:lnRef>
+          <a:fillRef idx="1">
+            <a:schemeClr val="accent4"/>
+          </a:fillRef>
+          <a:effectRef idx="0">
+            <a:schemeClr val="accent4"/>
+          </a:effectRef>
+          <a:fontRef idx="minor">
+            <a:schemeClr val="lt1"/>
+          </a:fontRef>
+        </p:style>
+        <p:txBody>
+          <a:bodyPr rtlCol="0" anchor="ctr"/>
+          <a:lstStyle/>
+          <a:p>
+            <a:pPr algn="ctr"/>
+            <a:r>
+              <a:rPr lang="es-CL" sz="1600" dirty="0" smtClean="0"/>
+              <a:t>Sho</a:t>
+            </a:r>
+            <a:r>
+              <a:rPr lang="es-CL" sz="1600" dirty="0" smtClean="0"/>
+              <a:t>w </a:t>
+            </a:r>
+          </a:p>
+          <a:p>
+            <a:pPr algn="ctr"/>
+            <a:r>
+              <a:rPr lang="es-CL" sz="1600" dirty="0" smtClean="0"/>
+              <a:t>filtro</a:t>
+            </a:r>
+            <a:endParaRPr lang="es-419" sz="1600" dirty="0"/>
+          </a:p>
+        </p:txBody>
+      </p:sp>
+      <p:sp>
+        <p:nvSpPr>
+          <p:cNvPr id="85" name="Rectángulo redondeado 84"/>
+          <p:cNvSpPr/>
+          <p:nvPr/>
+        </p:nvSpPr>
+        <p:spPr>
+          <a:xfrm>
+            <a:off x="9948166" y="5818319"/>
+            <a:ext cx="1133340" cy="576000"/>
+          </a:xfrm>
+          <a:prstGeom prst="roundRect">
+            <a:avLst/>
+          </a:prstGeom>
+        </p:spPr>
+        <p:style>
+          <a:lnRef idx="2">
+            <a:schemeClr val="accent2">
+              <a:shade val="50000"/>
+            </a:schemeClr>
+          </a:lnRef>
+          <a:fillRef idx="1">
+            <a:schemeClr val="accent2"/>
+          </a:fillRef>
+          <a:effectRef idx="0">
+            <a:schemeClr val="accent2"/>
+          </a:effectRef>
+          <a:fontRef idx="minor">
+            <a:schemeClr val="lt1"/>
+          </a:fontRef>
+        </p:style>
+        <p:txBody>
+          <a:bodyPr rtlCol="0" anchor="ctr"/>
+          <a:lstStyle/>
+          <a:p>
+            <a:pPr algn="ctr"/>
+            <a:r>
+              <a:rPr lang="es-CL" dirty="0" err="1" smtClean="0"/>
+              <a:t>update</a:t>
+            </a:r>
+            <a:endParaRPr lang="es-CL" dirty="0" smtClean="0"/>
+          </a:p>
+          <a:p>
+            <a:pPr algn="ctr"/>
+            <a:r>
+              <a:rPr lang="es-CL" dirty="0" err="1" smtClean="0"/>
+              <a:t>acv.edit</a:t>
+            </a:r>
+            <a:endParaRPr lang="es-419" dirty="0"/>
+          </a:p>
+        </p:txBody>
+      </p:sp>
+      <p:sp>
+        <p:nvSpPr>
+          <p:cNvPr id="42" name="Rectángulo 41"/>
+          <p:cNvSpPr/>
+          <p:nvPr/>
+        </p:nvSpPr>
+        <p:spPr>
+          <a:xfrm>
+            <a:off x="4418563" y="1501197"/>
+            <a:ext cx="1435219" cy="1416086"/>
           </a:xfrm>
           <a:prstGeom prst="rect">
             <a:avLst/>
@@ -3374,147 +3898,289 @@
           <a:bodyPr rtlCol="0" anchor="ctr"/>
           <a:lstStyle/>
           <a:p>
-            <a:pPr algn="ctr"/>
-            <a:r>
-              <a:rPr lang="es-CL" dirty="0" err="1" smtClean="0"/>
-              <a:t>semiperEdit</a:t>
-            </a:r>
-            <a:r>
-              <a:rPr lang="es-CL" dirty="0" smtClean="0"/>
-              <a:t>(lista)</a:t>
-            </a:r>
-            <a:endParaRPr lang="es-419" dirty="0"/>
-          </a:p>
-        </p:txBody>
-      </p:sp>
-      <p:cxnSp>
-        <p:nvCxnSpPr>
-          <p:cNvPr id="7" name="Conector recto de flecha 6"/>
-          <p:cNvCxnSpPr>
-            <a:stCxn id="45" idx="3"/>
-            <a:endCxn id="8" idx="1"/>
-          </p:cNvCxnSpPr>
-          <p:nvPr/>
-        </p:nvCxnSpPr>
-        <p:spPr>
-          <a:xfrm>
-            <a:off x="3980959" y="2012101"/>
-            <a:ext cx="502276" cy="0"/>
-          </a:xfrm>
-          <a:prstGeom prst="straightConnector1">
-            <a:avLst/>
-          </a:prstGeom>
-          <a:ln w="38100">
-            <a:tailEnd type="triangle"/>
-          </a:ln>
-        </p:spPr>
-        <p:style>
-          <a:lnRef idx="1">
-            <a:schemeClr val="accent1"/>
-          </a:lnRef>
-          <a:fillRef idx="0">
-            <a:schemeClr val="accent1"/>
-          </a:fillRef>
-          <a:effectRef idx="0">
-            <a:schemeClr val="accent1"/>
-          </a:effectRef>
-          <a:fontRef idx="minor">
-            <a:schemeClr val="tx1"/>
-          </a:fontRef>
-        </p:style>
-      </p:cxnSp>
-      <p:sp>
-        <p:nvSpPr>
-          <p:cNvPr id="46" name="CuadroTexto 45"/>
-          <p:cNvSpPr txBox="1"/>
-          <p:nvPr/>
-        </p:nvSpPr>
-        <p:spPr>
-          <a:xfrm>
-            <a:off x="180304" y="180304"/>
-            <a:ext cx="11552350" cy="954107"/>
+            <a:r>
+              <a:rPr lang="es-CL" sz="1600" dirty="0" err="1" smtClean="0"/>
+              <a:t>acveditRDS</a:t>
+            </a:r>
+            <a:r>
+              <a:rPr lang="es-CL" sz="1600" dirty="0" smtClean="0"/>
+              <a:t>()</a:t>
+            </a:r>
+          </a:p>
+          <a:p>
+            <a:r>
+              <a:rPr lang="es-CL" sz="1600" dirty="0" smtClean="0">
+                <a:solidFill>
+                  <a:schemeClr val="accent1">
+                    <a:lumMod val="50000"/>
+                  </a:schemeClr>
+                </a:solidFill>
+              </a:rPr>
+              <a:t>- </a:t>
+            </a:r>
+            <a:r>
+              <a:rPr lang="es-CL" sz="1600" dirty="0" err="1" smtClean="0">
+                <a:solidFill>
+                  <a:schemeClr val="accent1">
+                    <a:lumMod val="50000"/>
+                  </a:schemeClr>
+                </a:solidFill>
+              </a:rPr>
+              <a:t>semiper</a:t>
+            </a:r>
+            <a:endParaRPr lang="es-CL" sz="1600" dirty="0" smtClean="0">
+              <a:solidFill>
+                <a:schemeClr val="accent1">
+                  <a:lumMod val="50000"/>
+                </a:schemeClr>
+              </a:solidFill>
+            </a:endParaRPr>
+          </a:p>
+          <a:p>
+            <a:r>
+              <a:rPr lang="es-CL" sz="1600" dirty="0" smtClean="0">
+                <a:solidFill>
+                  <a:schemeClr val="accent1">
+                    <a:lumMod val="50000"/>
+                  </a:schemeClr>
+                </a:solidFill>
+              </a:rPr>
+              <a:t>- </a:t>
+            </a:r>
+            <a:r>
+              <a:rPr lang="es-CL" sz="1600" dirty="0" err="1" smtClean="0">
+                <a:solidFill>
+                  <a:schemeClr val="accent1">
+                    <a:lumMod val="50000"/>
+                  </a:schemeClr>
+                </a:solidFill>
+              </a:rPr>
+              <a:t>filtroNA</a:t>
+            </a:r>
+            <a:endParaRPr lang="es-CL" sz="1600" dirty="0" smtClean="0">
+              <a:solidFill>
+                <a:schemeClr val="accent1">
+                  <a:lumMod val="50000"/>
+                </a:schemeClr>
+              </a:solidFill>
+            </a:endParaRPr>
+          </a:p>
+          <a:p>
+            <a:r>
+              <a:rPr lang="es-CL" sz="1600" dirty="0" smtClean="0">
+                <a:solidFill>
+                  <a:schemeClr val="accent1">
+                    <a:lumMod val="50000"/>
+                  </a:schemeClr>
+                </a:solidFill>
+              </a:rPr>
+              <a:t>- </a:t>
+            </a:r>
+            <a:r>
+              <a:rPr lang="es-CL" sz="1600" dirty="0" err="1" smtClean="0">
+                <a:solidFill>
+                  <a:schemeClr val="accent1">
+                    <a:lumMod val="50000"/>
+                  </a:schemeClr>
+                </a:solidFill>
+              </a:rPr>
+              <a:t>filtroERROR</a:t>
+            </a:r>
+            <a:endParaRPr lang="es-CL" sz="1600" dirty="0" smtClean="0">
+              <a:solidFill>
+                <a:schemeClr val="accent1">
+                  <a:lumMod val="50000"/>
+                </a:schemeClr>
+              </a:solidFill>
+            </a:endParaRPr>
+          </a:p>
+          <a:p>
+            <a:r>
+              <a:rPr lang="es-CL" sz="1600" dirty="0" smtClean="0">
+                <a:solidFill>
+                  <a:schemeClr val="accent1">
+                    <a:lumMod val="50000"/>
+                  </a:schemeClr>
+                </a:solidFill>
+              </a:rPr>
+              <a:t>- </a:t>
+            </a:r>
+            <a:r>
+              <a:rPr lang="es-CL" sz="1600" dirty="0" err="1" smtClean="0">
+                <a:solidFill>
+                  <a:schemeClr val="accent1">
+                    <a:lumMod val="50000"/>
+                  </a:schemeClr>
+                </a:solidFill>
+              </a:rPr>
+              <a:t>timelist</a:t>
+            </a:r>
+            <a:endParaRPr lang="es-419" sz="1600" dirty="0">
+              <a:solidFill>
+                <a:schemeClr val="accent1">
+                  <a:lumMod val="50000"/>
+                </a:schemeClr>
+              </a:solidFill>
+            </a:endParaRPr>
+          </a:p>
+        </p:txBody>
+      </p:sp>
+      <p:sp>
+        <p:nvSpPr>
+          <p:cNvPr id="48" name="Rectángulo 47"/>
+          <p:cNvSpPr/>
+          <p:nvPr/>
+        </p:nvSpPr>
+        <p:spPr>
+          <a:xfrm>
+            <a:off x="4411298" y="3105741"/>
+            <a:ext cx="1435219" cy="869372"/>
           </a:xfrm>
           <a:prstGeom prst="rect">
             <a:avLst/>
           </a:prstGeom>
-          <a:noFill/>
-        </p:spPr>
-        <p:txBody>
-          <a:bodyPr wrap="square" rtlCol="0">
-            <a:spAutoFit/>
-          </a:bodyPr>
-          <a:lstStyle/>
-          <a:p>
-            <a:r>
-              <a:rPr lang="es-CL" sz="2400" b="1" dirty="0" err="1" smtClean="0"/>
-              <a:t>Seccion</a:t>
-            </a:r>
-            <a:r>
-              <a:rPr lang="es-CL" sz="2400" b="1" dirty="0" smtClean="0"/>
-              <a:t> 3</a:t>
-            </a:r>
-            <a:r>
-              <a:rPr lang="es-CL" sz="2400" dirty="0" smtClean="0"/>
-              <a:t>: </a:t>
-            </a:r>
-            <a:r>
-              <a:rPr lang="es-CL" sz="2400" b="1" dirty="0" smtClean="0"/>
-              <a:t>Proceso Editar</a:t>
-            </a:r>
-          </a:p>
-          <a:p>
+        </p:spPr>
+        <p:style>
+          <a:lnRef idx="2">
+            <a:schemeClr val="accent1">
+              <a:shade val="50000"/>
+            </a:schemeClr>
+          </a:lnRef>
+          <a:fillRef idx="1">
+            <a:schemeClr val="accent1"/>
+          </a:fillRef>
+          <a:effectRef idx="0">
+            <a:schemeClr val="accent1"/>
+          </a:effectRef>
+          <a:fontRef idx="minor">
+            <a:schemeClr val="lt1"/>
+          </a:fontRef>
+        </p:style>
+        <p:txBody>
+          <a:bodyPr rtlCol="0" anchor="ctr"/>
+          <a:lstStyle/>
+          <a:p>
+            <a:r>
+              <a:rPr lang="es-CL" sz="1600" dirty="0" err="1" smtClean="0"/>
+              <a:t>filterRDS</a:t>
+            </a:r>
             <a:r>
               <a:rPr lang="es-CL" sz="1600" dirty="0" smtClean="0"/>
-              <a:t>Al ejecutar la opción de editar Nos manda para la otra pestaña </a:t>
-            </a:r>
-            <a:r>
-              <a:rPr lang="es-CL" sz="1600" b="1" dirty="0" err="1" smtClean="0"/>
-              <a:t>acv.edit</a:t>
-            </a:r>
-            <a:r>
-              <a:rPr lang="es-CL" sz="1600" b="1" dirty="0" smtClean="0"/>
-              <a:t> es el que manda siempre</a:t>
-            </a:r>
-            <a:r>
-              <a:rPr lang="es-CL" sz="1600" dirty="0" smtClean="0"/>
-              <a:t> para sacar actividad, pero el filtro lo manda el archivo de filtro. Siempre por cada cambio, cada cosa se carga el </a:t>
-            </a:r>
+              <a:t>()</a:t>
+            </a:r>
+            <a:endParaRPr lang="es-CL" sz="1600" dirty="0" smtClean="0"/>
+          </a:p>
+          <a:p>
+            <a:r>
+              <a:rPr lang="es-CL" sz="1600" dirty="0" smtClean="0">
+                <a:solidFill>
+                  <a:schemeClr val="accent1">
+                    <a:lumMod val="50000"/>
+                  </a:schemeClr>
+                </a:solidFill>
+              </a:rPr>
+              <a:t>- </a:t>
+            </a:r>
+            <a:r>
+              <a:rPr lang="es-CL" sz="1600" dirty="0" err="1" smtClean="0">
+                <a:solidFill>
+                  <a:schemeClr val="accent1">
+                    <a:lumMod val="50000"/>
+                  </a:schemeClr>
+                </a:solidFill>
+              </a:rPr>
+              <a:t>header</a:t>
+            </a:r>
+            <a:endParaRPr lang="es-CL" sz="1600" dirty="0" smtClean="0">
+              <a:solidFill>
+                <a:schemeClr val="accent1">
+                  <a:lumMod val="50000"/>
+                </a:schemeClr>
+              </a:solidFill>
+            </a:endParaRPr>
+          </a:p>
+          <a:p>
+            <a:r>
+              <a:rPr lang="es-CL" sz="1600" dirty="0" smtClean="0">
+                <a:solidFill>
+                  <a:schemeClr val="accent1">
+                    <a:lumMod val="50000"/>
+                  </a:schemeClr>
+                </a:solidFill>
+              </a:rPr>
+              <a:t>- </a:t>
+            </a:r>
+            <a:r>
+              <a:rPr lang="es-CL" sz="1600" dirty="0" err="1" smtClean="0">
+                <a:solidFill>
+                  <a:schemeClr val="accent1">
+                    <a:lumMod val="50000"/>
+                  </a:schemeClr>
+                </a:solidFill>
+              </a:rPr>
+              <a:t>filter</a:t>
+            </a:r>
+            <a:endParaRPr lang="es-419" sz="1600" dirty="0">
+              <a:solidFill>
+                <a:schemeClr val="accent1">
+                  <a:lumMod val="50000"/>
+                </a:schemeClr>
+              </a:solidFill>
+            </a:endParaRPr>
+          </a:p>
+        </p:txBody>
+      </p:sp>
+      <p:sp>
+        <p:nvSpPr>
+          <p:cNvPr id="50" name="Rectángulo redondeado 49"/>
+          <p:cNvSpPr/>
+          <p:nvPr/>
+        </p:nvSpPr>
+        <p:spPr>
+          <a:xfrm>
+            <a:off x="2965320" y="3252427"/>
+            <a:ext cx="1004552" cy="576000"/>
+          </a:xfrm>
+          <a:prstGeom prst="roundRect">
+            <a:avLst/>
+          </a:prstGeom>
+        </p:spPr>
+        <p:style>
+          <a:lnRef idx="2">
+            <a:schemeClr val="accent2"/>
+          </a:lnRef>
+          <a:fillRef idx="1">
+            <a:schemeClr val="lt1"/>
+          </a:fillRef>
+          <a:effectRef idx="0">
+            <a:schemeClr val="accent2"/>
+          </a:effectRef>
+          <a:fontRef idx="minor">
+            <a:schemeClr val="dk1"/>
+          </a:fontRef>
+        </p:style>
+        <p:txBody>
+          <a:bodyPr rtlCol="0" anchor="ctr"/>
+          <a:lstStyle/>
+          <a:p>
+            <a:pPr algn="ctr"/>
             <a:r>
               <a:rPr lang="es-CL" sz="1600" dirty="0" err="1" smtClean="0"/>
-              <a:t>acv</a:t>
-            </a:r>
-            <a:r>
-              <a:rPr lang="es-CL" sz="1600" dirty="0" smtClean="0"/>
-              <a:t> y el </a:t>
-            </a:r>
-            <a:r>
-              <a:rPr lang="es-CL" sz="1600" dirty="0" err="1" smtClean="0"/>
-              <a:t>filter</a:t>
-            </a:r>
-            <a:r>
-              <a:rPr lang="es-CL" sz="1600" dirty="0" smtClean="0"/>
-              <a:t> de nuevo. Lo único que perdura es el </a:t>
-            </a:r>
-            <a:r>
-              <a:rPr lang="es-CL" sz="1600" b="1" dirty="0" err="1" smtClean="0"/>
-              <a:t>awdfile</a:t>
-            </a:r>
-            <a:r>
-              <a:rPr lang="es-CL" sz="1600" b="1" dirty="0" smtClean="0"/>
-              <a:t>()</a:t>
-            </a:r>
-          </a:p>
-        </p:txBody>
-      </p:sp>
-      <p:sp>
-        <p:nvSpPr>
-          <p:cNvPr id="47" name="Rectángulo 46"/>
+              <a:t>readRDS</a:t>
+            </a:r>
+            <a:endParaRPr lang="es-CL" sz="1600" dirty="0" smtClean="0"/>
+          </a:p>
+        </p:txBody>
+      </p:sp>
+      <p:sp>
+        <p:nvSpPr>
+          <p:cNvPr id="62" name="Rectángulo 61"/>
           <p:cNvSpPr/>
           <p:nvPr/>
         </p:nvSpPr>
         <p:spPr>
           <a:xfrm>
-            <a:off x="639590" y="3584915"/>
+            <a:off x="6287943" y="1914992"/>
             <a:ext cx="1043188" cy="576000"/>
           </a:xfrm>
           <a:prstGeom prst="rect">
@@ -3543,16 +4209,19 @@
           <a:p>
             <a:pPr algn="ctr"/>
             <a:r>
+              <a:rPr lang="es-CL" sz="1600" dirty="0" smtClean="0"/>
+              <a:t>Sho</a:t>
+            </a:r>
+            <a:r>
+              <a:rPr lang="es-CL" sz="1600" dirty="0" smtClean="0"/>
+              <a:t>w </a:t>
+            </a:r>
+          </a:p>
+          <a:p>
+            <a:pPr algn="ctr"/>
+            <a:r>
               <a:rPr lang="es-CL" sz="1600" dirty="0" err="1" smtClean="0"/>
-              <a:t>acv.edit</a:t>
-            </a:r>
-            <a:endParaRPr lang="es-CL" sz="1600" dirty="0" smtClean="0"/>
-          </a:p>
-          <a:p>
-            <a:pPr algn="ctr"/>
-            <a:r>
-              <a:rPr lang="es-CL" sz="1600" dirty="0" smtClean="0"/>
-              <a:t>FILE</a:t>
+              <a:t>Plot</a:t>
             </a:r>
             <a:endParaRPr lang="es-419" sz="1600" dirty="0"/>
           </a:p>
@@ -3560,14 +4229,14 @@
       </p:sp>
       <p:sp>
         <p:nvSpPr>
-          <p:cNvPr id="51" name="Rectángulo 50"/>
+          <p:cNvPr id="63" name="Rectángulo 62"/>
           <p:cNvSpPr/>
           <p:nvPr/>
         </p:nvSpPr>
         <p:spPr>
           <a:xfrm>
-            <a:off x="1966604" y="3584915"/>
-            <a:ext cx="1043188" cy="576000"/>
+            <a:off x="9948166" y="3096856"/>
+            <a:ext cx="1133340" cy="576000"/>
           </a:xfrm>
           <a:prstGeom prst="rect">
             <a:avLst/>
@@ -3575,15 +4244,15 @@
         </p:spPr>
         <p:style>
           <a:lnRef idx="2">
-            <a:schemeClr val="accent4">
+            <a:schemeClr val="accent1">
               <a:shade val="50000"/>
             </a:schemeClr>
           </a:lnRef>
           <a:fillRef idx="1">
-            <a:schemeClr val="accent4"/>
-          </a:fillRef>
-          <a:effectRef idx="0">
-            <a:schemeClr val="accent4"/>
+            <a:schemeClr val="accent1"/>
+          </a:fillRef>
+          <a:effectRef idx="0">
+            <a:schemeClr val="accent1"/>
           </a:effectRef>
           <a:fontRef idx="minor">
             <a:schemeClr val="lt1"/>
@@ -3595,86 +4264,37 @@
           <a:p>
             <a:pPr algn="ctr"/>
             <a:r>
+              <a:rPr lang="es-CL" sz="1600" dirty="0" smtClean="0"/>
+              <a:t>edición</a:t>
+            </a:r>
+          </a:p>
+          <a:p>
+            <a:pPr algn="ctr"/>
+            <a:r>
               <a:rPr lang="es-CL" sz="1600" dirty="0" err="1" smtClean="0"/>
-              <a:t>Filter</a:t>
-            </a:r>
-            <a:endParaRPr lang="es-CL" sz="1600" dirty="0" smtClean="0"/>
-          </a:p>
-          <a:p>
-            <a:pPr algn="ctr"/>
+              <a:t>list</a:t>
+            </a:r>
             <a:r>
               <a:rPr lang="es-CL" sz="1600" dirty="0" smtClean="0"/>
-              <a:t>FILE</a:t>
+              <a:t>()</a:t>
             </a:r>
             <a:endParaRPr lang="es-419" sz="1600" dirty="0"/>
-          </a:p>
-        </p:txBody>
-      </p:sp>
-      <p:sp>
-        <p:nvSpPr>
-          <p:cNvPr id="52" name="Rectángulo redondeado 51"/>
-          <p:cNvSpPr/>
-          <p:nvPr/>
-        </p:nvSpPr>
-        <p:spPr>
-          <a:xfrm>
-            <a:off x="1310972" y="1729376"/>
-            <a:ext cx="1004552" cy="576000"/>
-          </a:xfrm>
-          <a:prstGeom prst="roundRect">
-            <a:avLst/>
-          </a:prstGeom>
-        </p:spPr>
-        <p:style>
-          <a:lnRef idx="2">
-            <a:schemeClr val="accent2">
-              <a:shade val="50000"/>
-            </a:schemeClr>
-          </a:lnRef>
-          <a:fillRef idx="1">
-            <a:schemeClr val="accent2"/>
-          </a:fillRef>
-          <a:effectRef idx="0">
-            <a:schemeClr val="accent2"/>
-          </a:effectRef>
-          <a:fontRef idx="minor">
-            <a:schemeClr val="lt1"/>
-          </a:fontRef>
-        </p:style>
-        <p:txBody>
-          <a:bodyPr rtlCol="0" anchor="ctr"/>
-          <a:lstStyle/>
-          <a:p>
-            <a:pPr algn="ctr"/>
-            <a:r>
-              <a:rPr lang="es-CL" dirty="0" err="1" smtClean="0"/>
-              <a:t>check</a:t>
-            </a:r>
-            <a:endParaRPr lang="es-CL" dirty="0" smtClean="0"/>
-          </a:p>
-          <a:p>
-            <a:pPr algn="ctr"/>
-            <a:r>
-              <a:rPr lang="es-CL" dirty="0" err="1" smtClean="0"/>
-              <a:t>acvfilter</a:t>
-            </a:r>
-            <a:endParaRPr lang="es-419" dirty="0"/>
           </a:p>
         </p:txBody>
       </p:sp>
       <p:cxnSp>
         <p:nvCxnSpPr>
-          <p:cNvPr id="15" name="Conector recto de flecha 14"/>
+          <p:cNvPr id="36" name="Conector recto de flecha 35"/>
           <p:cNvCxnSpPr>
-            <a:stCxn id="52" idx="3"/>
-            <a:endCxn id="45" idx="1"/>
+            <a:stCxn id="63" idx="2"/>
+            <a:endCxn id="67" idx="0"/>
           </p:cNvCxnSpPr>
           <p:nvPr/>
         </p:nvCxnSpPr>
         <p:spPr>
-          <a:xfrm flipV="1">
-            <a:off x="2315524" y="2012101"/>
-            <a:ext cx="319590" cy="5275"/>
+          <a:xfrm>
+            <a:off x="10514836" y="3672856"/>
+            <a:ext cx="0" cy="264086"/>
           </a:xfrm>
           <a:prstGeom prst="straightConnector1">
             <a:avLst/>
@@ -3698,75 +4318,21 @@
           </a:fontRef>
         </p:style>
       </p:cxnSp>
-      <p:sp>
-        <p:nvSpPr>
-          <p:cNvPr id="61" name="Datos 60"/>
-          <p:cNvSpPr/>
-          <p:nvPr/>
-        </p:nvSpPr>
-        <p:spPr>
-          <a:xfrm>
-            <a:off x="7320769" y="2072392"/>
-            <a:ext cx="1634742" cy="576000"/>
-          </a:xfrm>
-          <a:prstGeom prst="flowChartInputOutput">
-            <a:avLst/>
-          </a:prstGeom>
-        </p:spPr>
-        <p:style>
-          <a:lnRef idx="2">
-            <a:schemeClr val="accent6">
-              <a:shade val="50000"/>
-            </a:schemeClr>
-          </a:lnRef>
-          <a:fillRef idx="1">
-            <a:schemeClr val="accent6"/>
-          </a:fillRef>
-          <a:effectRef idx="0">
-            <a:schemeClr val="accent6"/>
-          </a:effectRef>
-          <a:fontRef idx="minor">
-            <a:schemeClr val="lt1"/>
-          </a:fontRef>
-        </p:style>
-        <p:txBody>
-          <a:bodyPr rtlCol="0" anchor="ctr"/>
-          <a:lstStyle/>
-          <a:p>
-            <a:pPr algn="ctr"/>
-            <a:r>
-              <a:rPr lang="es-CL" sz="1600" dirty="0" smtClean="0"/>
-              <a:t>editar</a:t>
-            </a:r>
-          </a:p>
-          <a:p>
-            <a:pPr algn="ctr"/>
-            <a:r>
-              <a:rPr lang="es-CL" sz="1600" dirty="0" smtClean="0"/>
-              <a:t>periodo</a:t>
-            </a:r>
-            <a:endParaRPr lang="es-419" sz="1600" dirty="0"/>
-          </a:p>
-        </p:txBody>
-      </p:sp>
       <p:cxnSp>
         <p:nvCxnSpPr>
-          <p:cNvPr id="18" name="Conector angular 17"/>
+          <p:cNvPr id="38" name="Conector recto de flecha 37"/>
           <p:cNvCxnSpPr>
-            <a:stCxn id="8" idx="3"/>
-            <a:endCxn id="33" idx="2"/>
+            <a:endCxn id="74" idx="0"/>
           </p:cNvCxnSpPr>
           <p:nvPr/>
         </p:nvCxnSpPr>
         <p:spPr>
-          <a:xfrm flipV="1">
-            <a:off x="5526423" y="1615114"/>
-            <a:ext cx="1957820" cy="396987"/>
-          </a:xfrm>
-          <a:prstGeom prst="bentConnector3">
-            <a:avLst>
-              <a:gd name="adj1" fmla="val 50000"/>
-            </a:avLst>
+          <a:xfrm>
+            <a:off x="10514836" y="4512942"/>
+            <a:ext cx="0" cy="464668"/>
+          </a:xfrm>
+          <a:prstGeom prst="straightConnector1">
+            <a:avLst/>
           </a:prstGeom>
           <a:ln w="38100">
             <a:tailEnd type="triangle"/>
@@ -3789,22 +4355,20 @@
       </p:cxnSp>
       <p:cxnSp>
         <p:nvCxnSpPr>
-          <p:cNvPr id="21" name="Conector angular 20"/>
+          <p:cNvPr id="41" name="Conector recto de flecha 40"/>
           <p:cNvCxnSpPr>
-            <a:stCxn id="8" idx="3"/>
-            <a:endCxn id="61" idx="2"/>
+            <a:stCxn id="74" idx="2"/>
+            <a:endCxn id="85" idx="0"/>
           </p:cNvCxnSpPr>
           <p:nvPr/>
         </p:nvCxnSpPr>
         <p:spPr>
           <a:xfrm>
-            <a:off x="5526423" y="2012101"/>
-            <a:ext cx="1957820" cy="348291"/>
-          </a:xfrm>
-          <a:prstGeom prst="bentConnector3">
-            <a:avLst>
-              <a:gd name="adj1" fmla="val 50000"/>
-            </a:avLst>
+            <a:off x="10514836" y="5553610"/>
+            <a:ext cx="0" cy="264709"/>
+          </a:xfrm>
+          <a:prstGeom prst="straightConnector1">
+            <a:avLst/>
           </a:prstGeom>
           <a:ln w="38100">
             <a:tailEnd type="triangle"/>
@@ -3825,76 +4389,21 @@
           </a:fontRef>
         </p:style>
       </p:cxnSp>
-      <p:sp>
-        <p:nvSpPr>
-          <p:cNvPr id="67" name="Rectángulo 66"/>
-          <p:cNvSpPr/>
-          <p:nvPr/>
-        </p:nvSpPr>
-        <p:spPr>
-          <a:xfrm>
-            <a:off x="9523164" y="1724101"/>
-            <a:ext cx="1043188" cy="576000"/>
-          </a:xfrm>
-          <a:prstGeom prst="rect">
-            <a:avLst/>
-          </a:prstGeom>
-        </p:spPr>
-        <p:style>
-          <a:lnRef idx="2">
-            <a:schemeClr val="accent5">
-              <a:shade val="50000"/>
-            </a:schemeClr>
-          </a:lnRef>
-          <a:fillRef idx="1">
-            <a:schemeClr val="accent5"/>
-          </a:fillRef>
-          <a:effectRef idx="0">
-            <a:schemeClr val="accent5"/>
-          </a:effectRef>
-          <a:fontRef idx="minor">
-            <a:schemeClr val="lt1"/>
-          </a:fontRef>
-        </p:style>
-        <p:txBody>
-          <a:bodyPr rtlCol="0" anchor="ctr"/>
-          <a:lstStyle/>
-          <a:p>
-            <a:pPr algn="ctr"/>
-            <a:r>
-              <a:rPr lang="es-CL" dirty="0" err="1" smtClean="0"/>
-              <a:t>Button</a:t>
-            </a:r>
-            <a:r>
-              <a:rPr lang="es-CL" dirty="0" smtClean="0"/>
-              <a:t> </a:t>
-            </a:r>
-          </a:p>
-          <a:p>
-            <a:pPr algn="ctr"/>
-            <a:r>
-              <a:rPr lang="es-CL" dirty="0" err="1" smtClean="0"/>
-              <a:t>Action</a:t>
-            </a:r>
-            <a:endParaRPr lang="es-419" dirty="0"/>
-          </a:p>
-        </p:txBody>
-      </p:sp>
       <p:cxnSp>
         <p:nvCxnSpPr>
-          <p:cNvPr id="26" name="Conector angular 25"/>
+          <p:cNvPr id="53" name="Conector angular 52"/>
           <p:cNvCxnSpPr>
             <a:stCxn id="33" idx="5"/>
-            <a:endCxn id="67" idx="1"/>
+            <a:endCxn id="63" idx="0"/>
           </p:cNvCxnSpPr>
           <p:nvPr/>
         </p:nvCxnSpPr>
         <p:spPr>
           <a:xfrm>
-            <a:off x="8792037" y="1615114"/>
-            <a:ext cx="731127" cy="396987"/>
-          </a:xfrm>
-          <a:prstGeom prst="bentConnector3">
+            <a:off x="10154745" y="2217268"/>
+            <a:ext cx="360091" cy="879588"/>
+          </a:xfrm>
+          <a:prstGeom prst="bentConnector2">
             <a:avLst/>
           </a:prstGeom>
           <a:ln w="38100">
@@ -3918,19 +4427,19 @@
       </p:cxnSp>
       <p:cxnSp>
         <p:nvCxnSpPr>
-          <p:cNvPr id="28" name="Conector angular 27"/>
+          <p:cNvPr id="55" name="Conector recto de flecha 54"/>
           <p:cNvCxnSpPr>
-            <a:stCxn id="61" idx="5"/>
-            <a:endCxn id="67" idx="1"/>
+            <a:stCxn id="47" idx="3"/>
+            <a:endCxn id="52" idx="1"/>
           </p:cNvCxnSpPr>
           <p:nvPr/>
         </p:nvCxnSpPr>
         <p:spPr>
-          <a:xfrm flipV="1">
-            <a:off x="8792037" y="2012101"/>
-            <a:ext cx="731127" cy="348291"/>
-          </a:xfrm>
-          <a:prstGeom prst="bentConnector3">
+          <a:xfrm>
+            <a:off x="2516630" y="2209240"/>
+            <a:ext cx="448690" cy="0"/>
+          </a:xfrm>
+          <a:prstGeom prst="straightConnector1">
             <a:avLst/>
           </a:prstGeom>
           <a:ln w="38100">
@@ -3952,123 +4461,19 @@
           </a:fontRef>
         </p:style>
       </p:cxnSp>
-      <p:sp>
-        <p:nvSpPr>
-          <p:cNvPr id="74" name="Rectángulo redondeado 73"/>
-          <p:cNvSpPr/>
-          <p:nvPr/>
-        </p:nvSpPr>
-        <p:spPr>
-          <a:xfrm>
-            <a:off x="9523164" y="2654508"/>
-            <a:ext cx="1043188" cy="576000"/>
-          </a:xfrm>
-          <a:prstGeom prst="roundRect">
-            <a:avLst/>
-          </a:prstGeom>
-        </p:spPr>
-        <p:style>
-          <a:lnRef idx="2">
-            <a:schemeClr val="accent2">
-              <a:shade val="50000"/>
-            </a:schemeClr>
-          </a:lnRef>
-          <a:fillRef idx="1">
-            <a:schemeClr val="accent2"/>
-          </a:fillRef>
-          <a:effectRef idx="0">
-            <a:schemeClr val="accent2"/>
-          </a:effectRef>
-          <a:fontRef idx="minor">
-            <a:schemeClr val="lt1"/>
-          </a:fontRef>
-        </p:style>
-        <p:txBody>
-          <a:bodyPr rtlCol="0" anchor="ctr"/>
-          <a:lstStyle/>
-          <a:p>
-            <a:pPr algn="ctr"/>
-            <a:r>
-              <a:rPr lang="es-CL" dirty="0" err="1" smtClean="0"/>
-              <a:t>update</a:t>
-            </a:r>
-            <a:endParaRPr lang="es-CL" dirty="0" smtClean="0"/>
-          </a:p>
-          <a:p>
-            <a:pPr algn="ctr"/>
-            <a:r>
-              <a:rPr lang="es-CL" dirty="0" err="1" smtClean="0"/>
-              <a:t>filter</a:t>
-            </a:r>
-            <a:endParaRPr lang="es-419" dirty="0"/>
-          </a:p>
-        </p:txBody>
-      </p:sp>
-      <p:sp>
-        <p:nvSpPr>
-          <p:cNvPr id="75" name="Rectángulo 74"/>
-          <p:cNvSpPr/>
-          <p:nvPr/>
-        </p:nvSpPr>
-        <p:spPr>
-          <a:xfrm>
-            <a:off x="9523164" y="3584915"/>
-            <a:ext cx="1043188" cy="576000"/>
-          </a:xfrm>
-          <a:prstGeom prst="rect">
-            <a:avLst/>
-          </a:prstGeom>
-        </p:spPr>
-        <p:style>
-          <a:lnRef idx="2">
-            <a:schemeClr val="accent4">
-              <a:shade val="50000"/>
-            </a:schemeClr>
-          </a:lnRef>
-          <a:fillRef idx="1">
-            <a:schemeClr val="accent4"/>
-          </a:fillRef>
-          <a:effectRef idx="0">
-            <a:schemeClr val="accent4"/>
-          </a:effectRef>
-          <a:fontRef idx="minor">
-            <a:schemeClr val="lt1"/>
-          </a:fontRef>
-        </p:style>
-        <p:txBody>
-          <a:bodyPr rtlCol="0" anchor="ctr"/>
-          <a:lstStyle/>
-          <a:p>
-            <a:pPr algn="ctr"/>
-            <a:r>
-              <a:rPr lang="es-CL" sz="1600" dirty="0" err="1" smtClean="0"/>
-              <a:t>Filter</a:t>
-            </a:r>
-            <a:endParaRPr lang="es-CL" sz="1600" dirty="0" smtClean="0"/>
-          </a:p>
-          <a:p>
-            <a:pPr algn="ctr"/>
-            <a:r>
-              <a:rPr lang="es-CL" sz="1600" dirty="0" smtClean="0"/>
-              <a:t>FILE</a:t>
-            </a:r>
-            <a:endParaRPr lang="es-419" sz="1600" dirty="0"/>
-          </a:p>
-        </p:txBody>
-      </p:sp>
       <p:cxnSp>
         <p:nvCxnSpPr>
-          <p:cNvPr id="31" name="Conector recto de flecha 30"/>
+          <p:cNvPr id="57" name="Conector recto de flecha 56"/>
           <p:cNvCxnSpPr>
-            <a:stCxn id="67" idx="2"/>
-            <a:endCxn id="74" idx="0"/>
+            <a:stCxn id="52" idx="3"/>
+            <a:endCxn id="42" idx="1"/>
           </p:cNvCxnSpPr>
           <p:nvPr/>
         </p:nvCxnSpPr>
         <p:spPr>
           <a:xfrm>
-            <a:off x="10044758" y="2300101"/>
-            <a:ext cx="0" cy="354407"/>
+            <a:off x="3969872" y="2209240"/>
+            <a:ext cx="448691" cy="0"/>
           </a:xfrm>
           <a:prstGeom prst="straightConnector1">
             <a:avLst/>
@@ -4094,17 +4499,17 @@
       </p:cxnSp>
       <p:cxnSp>
         <p:nvCxnSpPr>
-          <p:cNvPr id="34" name="Conector recto de flecha 33"/>
+          <p:cNvPr id="60" name="Conector recto de flecha 59"/>
           <p:cNvCxnSpPr>
-            <a:stCxn id="74" idx="2"/>
-            <a:endCxn id="75" idx="0"/>
+            <a:stCxn id="51" idx="3"/>
+            <a:endCxn id="50" idx="1"/>
           </p:cNvCxnSpPr>
           <p:nvPr/>
         </p:nvCxnSpPr>
         <p:spPr>
           <a:xfrm>
-            <a:off x="10044758" y="3230508"/>
-            <a:ext cx="0" cy="354407"/>
+            <a:off x="2516629" y="3536222"/>
+            <a:ext cx="448691" cy="4205"/>
           </a:xfrm>
           <a:prstGeom prst="straightConnector1">
             <a:avLst/>
@@ -4128,71 +4533,19 @@
           </a:fontRef>
         </p:style>
       </p:cxnSp>
-      <p:sp>
-        <p:nvSpPr>
-          <p:cNvPr id="85" name="Rectángulo redondeado 84"/>
-          <p:cNvSpPr/>
-          <p:nvPr/>
-        </p:nvSpPr>
-        <p:spPr>
-          <a:xfrm>
-            <a:off x="9523164" y="4515322"/>
-            <a:ext cx="1043188" cy="576000"/>
-          </a:xfrm>
-          <a:prstGeom prst="roundRect">
-            <a:avLst/>
-          </a:prstGeom>
-        </p:spPr>
-        <p:style>
-          <a:lnRef idx="2">
-            <a:schemeClr val="accent2">
-              <a:shade val="50000"/>
-            </a:schemeClr>
-          </a:lnRef>
-          <a:fillRef idx="1">
-            <a:schemeClr val="accent2"/>
-          </a:fillRef>
-          <a:effectRef idx="0">
-            <a:schemeClr val="accent2"/>
-          </a:effectRef>
-          <a:fontRef idx="minor">
-            <a:schemeClr val="lt1"/>
-          </a:fontRef>
-        </p:style>
-        <p:txBody>
-          <a:bodyPr rtlCol="0" anchor="ctr"/>
-          <a:lstStyle/>
-          <a:p>
-            <a:pPr algn="ctr"/>
-            <a:r>
-              <a:rPr lang="es-CL" dirty="0" err="1" smtClean="0"/>
-              <a:t>update</a:t>
-            </a:r>
-            <a:endParaRPr lang="es-CL" dirty="0" smtClean="0"/>
-          </a:p>
-          <a:p>
-            <a:pPr algn="ctr"/>
-            <a:r>
-              <a:rPr lang="es-CL" dirty="0" err="1" smtClean="0"/>
-              <a:t>acv.edit</a:t>
-            </a:r>
-            <a:endParaRPr lang="es-419" dirty="0"/>
-          </a:p>
-        </p:txBody>
-      </p:sp>
       <p:cxnSp>
         <p:nvCxnSpPr>
-          <p:cNvPr id="44" name="Conector recto de flecha 43"/>
+          <p:cNvPr id="68" name="Conector recto de flecha 67"/>
           <p:cNvCxnSpPr>
-            <a:stCxn id="75" idx="2"/>
-            <a:endCxn id="85" idx="0"/>
+            <a:stCxn id="50" idx="3"/>
+            <a:endCxn id="48" idx="1"/>
           </p:cNvCxnSpPr>
           <p:nvPr/>
         </p:nvCxnSpPr>
         <p:spPr>
           <a:xfrm>
-            <a:off x="10044758" y="4160915"/>
-            <a:ext cx="0" cy="354407"/>
+            <a:off x="3969872" y="3540427"/>
+            <a:ext cx="441426" cy="0"/>
           </a:xfrm>
           <a:prstGeom prst="straightConnector1">
             <a:avLst/>
@@ -4216,71 +4569,19 @@
           </a:fontRef>
         </p:style>
       </p:cxnSp>
-      <p:sp>
-        <p:nvSpPr>
-          <p:cNvPr id="87" name="Rectángulo 86"/>
-          <p:cNvSpPr/>
-          <p:nvPr/>
-        </p:nvSpPr>
-        <p:spPr>
-          <a:xfrm>
-            <a:off x="7912323" y="4515322"/>
-            <a:ext cx="1043188" cy="576000"/>
-          </a:xfrm>
-          <a:prstGeom prst="rect">
-            <a:avLst/>
-          </a:prstGeom>
-        </p:spPr>
-        <p:style>
-          <a:lnRef idx="2">
-            <a:schemeClr val="accent4">
-              <a:shade val="50000"/>
-            </a:schemeClr>
-          </a:lnRef>
-          <a:fillRef idx="1">
-            <a:schemeClr val="accent4"/>
-          </a:fillRef>
-          <a:effectRef idx="0">
-            <a:schemeClr val="accent4"/>
-          </a:effectRef>
-          <a:fontRef idx="minor">
-            <a:schemeClr val="lt1"/>
-          </a:fontRef>
-        </p:style>
-        <p:txBody>
-          <a:bodyPr rtlCol="0" anchor="ctr"/>
-          <a:lstStyle/>
-          <a:p>
-            <a:pPr algn="ctr"/>
-            <a:r>
-              <a:rPr lang="es-CL" sz="1600" dirty="0" err="1" smtClean="0"/>
-              <a:t>acv.edit</a:t>
-            </a:r>
-            <a:endParaRPr lang="es-CL" sz="1600" dirty="0" smtClean="0"/>
-          </a:p>
-          <a:p>
-            <a:pPr algn="ctr"/>
-            <a:r>
-              <a:rPr lang="es-CL" sz="1600" dirty="0" smtClean="0"/>
-              <a:t>FILE</a:t>
-            </a:r>
-            <a:endParaRPr lang="es-419" sz="1600" dirty="0"/>
-          </a:p>
-        </p:txBody>
-      </p:sp>
       <p:cxnSp>
         <p:nvCxnSpPr>
-          <p:cNvPr id="49" name="Conector recto de flecha 48"/>
+          <p:cNvPr id="71" name="Conector recto de flecha 70"/>
           <p:cNvCxnSpPr>
-            <a:stCxn id="85" idx="1"/>
-            <a:endCxn id="87" idx="3"/>
+            <a:stCxn id="42" idx="3"/>
+            <a:endCxn id="62" idx="1"/>
           </p:cNvCxnSpPr>
           <p:nvPr/>
         </p:nvCxnSpPr>
         <p:spPr>
-          <a:xfrm flipH="1">
-            <a:off x="8955511" y="4803322"/>
-            <a:ext cx="567653" cy="0"/>
+          <a:xfrm flipV="1">
+            <a:off x="5853782" y="2202992"/>
+            <a:ext cx="434161" cy="6248"/>
           </a:xfrm>
           <a:prstGeom prst="straightConnector1">
             <a:avLst/>
@@ -4306,19 +4607,19 @@
       </p:cxnSp>
       <p:cxnSp>
         <p:nvCxnSpPr>
-          <p:cNvPr id="59" name="Conector angular 58"/>
+          <p:cNvPr id="73" name="Conector recto de flecha 72"/>
           <p:cNvCxnSpPr>
-            <a:stCxn id="51" idx="0"/>
-            <a:endCxn id="52" idx="2"/>
+            <a:stCxn id="48" idx="3"/>
+            <a:endCxn id="75" idx="1"/>
           </p:cNvCxnSpPr>
           <p:nvPr/>
         </p:nvCxnSpPr>
         <p:spPr>
-          <a:xfrm rot="16200000" flipV="1">
-            <a:off x="1510954" y="2607671"/>
-            <a:ext cx="1279539" cy="674950"/>
-          </a:xfrm>
-          <a:prstGeom prst="bentConnector3">
+          <a:xfrm>
+            <a:off x="5846517" y="3540427"/>
+            <a:ext cx="441426" cy="4660"/>
+          </a:xfrm>
+          <a:prstGeom prst="straightConnector1">
             <a:avLst/>
           </a:prstGeom>
           <a:ln w="38100">
@@ -4342,19 +4643,19 @@
       </p:cxnSp>
       <p:cxnSp>
         <p:nvCxnSpPr>
-          <p:cNvPr id="64" name="Conector angular 63"/>
+          <p:cNvPr id="79" name="Conector recto de flecha 78"/>
           <p:cNvCxnSpPr>
-            <a:stCxn id="47" idx="0"/>
-            <a:endCxn id="52" idx="2"/>
+            <a:stCxn id="62" idx="3"/>
+            <a:endCxn id="33" idx="2"/>
           </p:cNvCxnSpPr>
           <p:nvPr/>
         </p:nvCxnSpPr>
         <p:spPr>
-          <a:xfrm rot="5400000" flipH="1" flipV="1">
-            <a:off x="847447" y="2619114"/>
-            <a:ext cx="1279539" cy="652064"/>
-          </a:xfrm>
-          <a:prstGeom prst="bentConnector3">
+          <a:xfrm>
+            <a:off x="7331131" y="2202992"/>
+            <a:ext cx="1080639" cy="14276"/>
+          </a:xfrm>
+          <a:prstGeom prst="straightConnector1">
             <a:avLst/>
           </a:prstGeom>
           <a:ln w="38100">
@@ -4376,291 +4677,24 @@
           </a:fontRef>
         </p:style>
       </p:cxnSp>
-      <p:sp>
-        <p:nvSpPr>
-          <p:cNvPr id="65" name="CuadroTexto 64"/>
-          <p:cNvSpPr txBox="1"/>
-          <p:nvPr/>
-        </p:nvSpPr>
-        <p:spPr>
-          <a:xfrm>
-            <a:off x="7778256" y="5056156"/>
-            <a:ext cx="1311321" cy="646331"/>
-          </a:xfrm>
-          <a:prstGeom prst="rect">
-            <a:avLst/>
-          </a:prstGeom>
-          <a:noFill/>
-        </p:spPr>
-        <p:txBody>
-          <a:bodyPr wrap="none" rtlCol="0">
-            <a:spAutoFit/>
-          </a:bodyPr>
-          <a:lstStyle/>
-          <a:p>
-            <a:pPr algn="ctr"/>
-            <a:r>
-              <a:rPr lang="es-CL" dirty="0" smtClean="0"/>
-              <a:t>el RDS</a:t>
-            </a:r>
-          </a:p>
-          <a:p>
-            <a:pPr algn="ctr"/>
-            <a:r>
-              <a:rPr lang="es-CL" dirty="0" smtClean="0"/>
-              <a:t>no el objeto</a:t>
-            </a:r>
-            <a:endParaRPr lang="es-419" dirty="0"/>
-          </a:p>
-        </p:txBody>
-      </p:sp>
-      <p:sp>
-        <p:nvSpPr>
-          <p:cNvPr id="98" name="CuadroTexto 97"/>
-          <p:cNvSpPr txBox="1"/>
-          <p:nvPr/>
-        </p:nvSpPr>
-        <p:spPr>
-          <a:xfrm>
-            <a:off x="10566352" y="3549749"/>
-            <a:ext cx="1311321" cy="646331"/>
-          </a:xfrm>
-          <a:prstGeom prst="rect">
-            <a:avLst/>
-          </a:prstGeom>
-          <a:noFill/>
-        </p:spPr>
-        <p:txBody>
-          <a:bodyPr wrap="none" rtlCol="0">
-            <a:spAutoFit/>
-          </a:bodyPr>
-          <a:lstStyle/>
-          <a:p>
-            <a:pPr algn="ctr"/>
-            <a:r>
-              <a:rPr lang="es-CL" dirty="0" smtClean="0"/>
-              <a:t>el </a:t>
-            </a:r>
-            <a:r>
-              <a:rPr lang="es-CL" dirty="0" smtClean="0"/>
-              <a:t>RDS</a:t>
-            </a:r>
-            <a:endParaRPr lang="es-CL" dirty="0" smtClean="0"/>
-          </a:p>
-          <a:p>
-            <a:pPr algn="ctr"/>
-            <a:r>
-              <a:rPr lang="es-CL" dirty="0" smtClean="0"/>
-              <a:t>no el objeto</a:t>
-            </a:r>
-            <a:endParaRPr lang="es-419" dirty="0"/>
-          </a:p>
-        </p:txBody>
-      </p:sp>
       <p:cxnSp>
         <p:nvCxnSpPr>
-          <p:cNvPr id="70" name="Conector recto de flecha 69"/>
+          <p:cNvPr id="92" name="Conector angular 91"/>
           <p:cNvCxnSpPr>
-            <a:stCxn id="75" idx="1"/>
-            <a:endCxn id="51" idx="3"/>
+            <a:stCxn id="74" idx="1"/>
+            <a:endCxn id="51" idx="2"/>
           </p:cNvCxnSpPr>
           <p:nvPr/>
         </p:nvCxnSpPr>
         <p:spPr>
-          <a:xfrm flipH="1">
-            <a:off x="3009792" y="3872915"/>
-            <a:ext cx="6513372" cy="0"/>
-          </a:xfrm>
-          <a:prstGeom prst="straightConnector1">
+          <a:xfrm rot="10800000">
+            <a:off x="1707072" y="3824222"/>
+            <a:ext cx="8241094" cy="1441388"/>
+          </a:xfrm>
+          <a:prstGeom prst="bentConnector2">
             <a:avLst/>
           </a:prstGeom>
           <a:ln w="38100">
-            <a:tailEnd type="triangle"/>
-          </a:ln>
-        </p:spPr>
-        <p:style>
-          <a:lnRef idx="1">
-            <a:schemeClr val="accent1"/>
-          </a:lnRef>
-          <a:fillRef idx="0">
-            <a:schemeClr val="accent1"/>
-          </a:fillRef>
-          <a:effectRef idx="0">
-            <a:schemeClr val="accent1"/>
-          </a:effectRef>
-          <a:fontRef idx="minor">
-            <a:schemeClr val="tx1"/>
-          </a:fontRef>
-        </p:style>
-      </p:cxnSp>
-      <p:cxnSp>
-        <p:nvCxnSpPr>
-          <p:cNvPr id="77" name="Conector angular 76"/>
-          <p:cNvCxnSpPr>
-            <a:stCxn id="87" idx="1"/>
-            <a:endCxn id="47" idx="2"/>
-          </p:cNvCxnSpPr>
-          <p:nvPr/>
-        </p:nvCxnSpPr>
-        <p:spPr>
-          <a:xfrm rot="10800000">
-            <a:off x="1161185" y="4160916"/>
-            <a:ext cx="6751139" cy="642407"/>
-          </a:xfrm>
-          <a:prstGeom prst="bentConnector2">
-            <a:avLst/>
-          </a:prstGeom>
-          <a:ln w="38100">
-            <a:tailEnd type="triangle"/>
-          </a:ln>
-        </p:spPr>
-        <p:style>
-          <a:lnRef idx="1">
-            <a:schemeClr val="accent1"/>
-          </a:lnRef>
-          <a:fillRef idx="0">
-            <a:schemeClr val="accent1"/>
-          </a:fillRef>
-          <a:effectRef idx="0">
-            <a:schemeClr val="accent1"/>
-          </a:effectRef>
-          <a:fontRef idx="minor">
-            <a:schemeClr val="tx1"/>
-          </a:fontRef>
-        </p:style>
-      </p:cxnSp>
-      <p:sp>
-        <p:nvSpPr>
-          <p:cNvPr id="80" name="CuadroTexto 79"/>
-          <p:cNvSpPr txBox="1"/>
-          <p:nvPr/>
-        </p:nvSpPr>
-        <p:spPr>
-          <a:xfrm>
-            <a:off x="3701844" y="2735176"/>
-            <a:ext cx="2740430" cy="923330"/>
-          </a:xfrm>
-          <a:prstGeom prst="rect">
-            <a:avLst/>
-          </a:prstGeom>
-          <a:noFill/>
-        </p:spPr>
-        <p:txBody>
-          <a:bodyPr wrap="none" rtlCol="0">
-            <a:spAutoFit/>
-          </a:bodyPr>
-          <a:lstStyle/>
-          <a:p>
-            <a:r>
-              <a:rPr lang="es-CL" dirty="0" smtClean="0"/>
-              <a:t>Siempre se cargan</a:t>
-            </a:r>
-          </a:p>
-          <a:p>
-            <a:r>
-              <a:rPr lang="es-CL" dirty="0" smtClean="0"/>
-              <a:t>desde cero, nada se recicla</a:t>
-            </a:r>
-          </a:p>
-          <a:p>
-            <a:r>
-              <a:rPr lang="es-CL" dirty="0" smtClean="0"/>
-              <a:t>para evitar posibles errores</a:t>
-            </a:r>
-            <a:endParaRPr lang="es-419" dirty="0"/>
-          </a:p>
-        </p:txBody>
-      </p:sp>
-      <p:sp>
-        <p:nvSpPr>
-          <p:cNvPr id="93" name="CuadroTexto 92"/>
-          <p:cNvSpPr txBox="1"/>
-          <p:nvPr/>
-        </p:nvSpPr>
-        <p:spPr>
-          <a:xfrm>
-            <a:off x="5589431" y="5975797"/>
-            <a:ext cx="6143223" cy="369332"/>
-          </a:xfrm>
-          <a:prstGeom prst="rect">
-            <a:avLst/>
-          </a:prstGeom>
-          <a:noFill/>
-        </p:spPr>
-        <p:txBody>
-          <a:bodyPr wrap="square" rtlCol="0">
-            <a:spAutoFit/>
-          </a:bodyPr>
-          <a:lstStyle/>
-          <a:p>
-            <a:r>
-              <a:rPr lang="es-CL" dirty="0" smtClean="0"/>
-              <a:t>Un reactive </a:t>
-            </a:r>
-            <a:r>
-              <a:rPr lang="es-CL" dirty="0" err="1" smtClean="0"/>
-              <a:t>poll</a:t>
-            </a:r>
-            <a:r>
-              <a:rPr lang="es-CL" dirty="0" smtClean="0"/>
-              <a:t> que cheque ambos files</a:t>
-            </a:r>
-            <a:endParaRPr lang="es-419" dirty="0"/>
-          </a:p>
-        </p:txBody>
-      </p:sp>
-      <p:sp>
-        <p:nvSpPr>
-          <p:cNvPr id="109" name="CuadroTexto 108"/>
-          <p:cNvSpPr txBox="1"/>
-          <p:nvPr/>
-        </p:nvSpPr>
-        <p:spPr>
-          <a:xfrm>
-            <a:off x="5421156" y="1077769"/>
-            <a:ext cx="1253723" cy="646331"/>
-          </a:xfrm>
-          <a:prstGeom prst="rect">
-            <a:avLst/>
-          </a:prstGeom>
-          <a:noFill/>
-        </p:spPr>
-        <p:txBody>
-          <a:bodyPr wrap="square" rtlCol="0">
-            <a:spAutoFit/>
-          </a:bodyPr>
-          <a:lstStyle/>
-          <a:p>
-            <a:pPr algn="ctr"/>
-            <a:r>
-              <a:rPr lang="es-CL" dirty="0" smtClean="0"/>
-              <a:t>Selecciona un </a:t>
-            </a:r>
-            <a:r>
-              <a:rPr lang="es-CL" dirty="0" err="1" smtClean="0"/>
-              <a:t>plot</a:t>
-            </a:r>
-            <a:endParaRPr lang="es-419" dirty="0"/>
-          </a:p>
-        </p:txBody>
-      </p:sp>
-      <p:cxnSp>
-        <p:nvCxnSpPr>
-          <p:cNvPr id="5" name="Conector recto de flecha 4"/>
-          <p:cNvCxnSpPr>
-            <a:stCxn id="109" idx="2"/>
-          </p:cNvCxnSpPr>
-          <p:nvPr/>
-        </p:nvCxnSpPr>
-        <p:spPr>
-          <a:xfrm flipH="1">
-            <a:off x="6048017" y="1724100"/>
-            <a:ext cx="1" cy="288001"/>
-          </a:xfrm>
-          <a:prstGeom prst="straightConnector1">
-            <a:avLst/>
-          </a:prstGeom>
-          <a:ln>
             <a:tailEnd type="triangle"/>
           </a:ln>
         </p:spPr>
@@ -4682,7 +4716,7 @@
     </p:spTree>
     <p:extLst>
       <p:ext uri="{BB962C8B-B14F-4D97-AF65-F5344CB8AC3E}">
-        <p14:creationId xmlns:p14="http://schemas.microsoft.com/office/powerpoint/2010/main" val="3318330363"/>
+        <p14:creationId xmlns:p14="http://schemas.microsoft.com/office/powerpoint/2010/main" val="1732730366"/>
       </p:ext>
     </p:extLst>
   </p:cSld>
@@ -7996,7 +8030,7 @@
         </p:nvSpPr>
         <p:spPr>
           <a:xfrm>
-            <a:off x="1248990" y="1712112"/>
+            <a:off x="785349" y="1892418"/>
             <a:ext cx="1171978" cy="643944"/>
           </a:xfrm>
           <a:prstGeom prst="rect">
@@ -8047,7 +8081,7 @@
         </p:nvSpPr>
         <p:spPr>
           <a:xfrm>
-            <a:off x="1248990" y="2663298"/>
+            <a:off x="785349" y="2843604"/>
             <a:ext cx="1171978" cy="643944"/>
           </a:xfrm>
           <a:prstGeom prst="rect">
@@ -8098,7 +8132,7 @@
         </p:nvSpPr>
         <p:spPr>
           <a:xfrm>
-            <a:off x="6837952" y="4451317"/>
+            <a:off x="6374311" y="4631623"/>
             <a:ext cx="1171978" cy="643944"/>
           </a:xfrm>
           <a:prstGeom prst="roundRect">
@@ -8142,7 +8176,7 @@
         </p:nvSpPr>
         <p:spPr>
           <a:xfrm>
-            <a:off x="3167941" y="2191551"/>
+            <a:off x="2704300" y="2371857"/>
             <a:ext cx="1173007" cy="643944"/>
           </a:xfrm>
           <a:prstGeom prst="rect">
@@ -8176,7 +8210,6 @@
               <a:rPr lang="es-CL" sz="1400" dirty="0" smtClean="0"/>
               <a:t>()</a:t>
             </a:r>
-            <a:endParaRPr lang="es-419" sz="1400" dirty="0"/>
           </a:p>
         </p:txBody>
       </p:sp>
@@ -8404,59 +8437,13 @@
       </p:sp>
       <p:sp>
         <p:nvSpPr>
-          <p:cNvPr id="100" name="CuadroTexto 99"/>
-          <p:cNvSpPr txBox="1"/>
-          <p:nvPr/>
-        </p:nvSpPr>
-        <p:spPr>
-          <a:xfrm>
-            <a:off x="725505" y="4990673"/>
-            <a:ext cx="3390925" cy="1077218"/>
-          </a:xfrm>
-          <a:prstGeom prst="rect">
-            <a:avLst/>
-          </a:prstGeom>
-          <a:noFill/>
-        </p:spPr>
-        <p:txBody>
-          <a:bodyPr wrap="square" rtlCol="0">
-            <a:spAutoFit/>
-          </a:bodyPr>
-          <a:lstStyle/>
-          <a:p>
-            <a:r>
-              <a:rPr lang="es-CL" sz="1600" dirty="0" smtClean="0"/>
-              <a:t>Funciona, pero le falta arreglar las dimensiones del </a:t>
-            </a:r>
-            <a:r>
-              <a:rPr lang="es-CL" sz="1600" dirty="0" err="1" smtClean="0"/>
-              <a:t>actograma</a:t>
-            </a:r>
-            <a:r>
-              <a:rPr lang="es-CL" sz="1600" dirty="0" smtClean="0"/>
-              <a:t> con un </a:t>
-            </a:r>
-            <a:r>
-              <a:rPr lang="es-CL" sz="1600" dirty="0" err="1" smtClean="0"/>
-              <a:t>renderUI</a:t>
-            </a:r>
-            <a:r>
-              <a:rPr lang="es-CL" sz="1600" dirty="0" smtClean="0"/>
-              <a:t>, ya está resuelto solo falta implementar</a:t>
-            </a:r>
-            <a:endParaRPr lang="es-419" sz="1600" dirty="0"/>
-          </a:p>
-        </p:txBody>
-      </p:sp>
-      <p:sp>
-        <p:nvSpPr>
           <p:cNvPr id="48" name="Rectángulo 47"/>
           <p:cNvSpPr/>
           <p:nvPr/>
         </p:nvSpPr>
         <p:spPr>
           <a:xfrm>
-            <a:off x="1248990" y="3614484"/>
+            <a:off x="785349" y="3794790"/>
             <a:ext cx="1173007" cy="643944"/>
           </a:xfrm>
           <a:prstGeom prst="rect">
@@ -8505,7 +8492,7 @@
         </p:nvCxnSpPr>
         <p:spPr>
           <a:xfrm flipH="1" flipV="1">
-            <a:off x="1834979" y="3307242"/>
+            <a:off x="1371338" y="3487548"/>
             <a:ext cx="515" cy="307242"/>
           </a:xfrm>
           <a:prstGeom prst="straightConnector1">
@@ -8538,7 +8525,7 @@
         </p:nvSpPr>
         <p:spPr>
           <a:xfrm>
-            <a:off x="4908920" y="1712112"/>
+            <a:off x="4445279" y="1892418"/>
             <a:ext cx="1171978" cy="643944"/>
           </a:xfrm>
           <a:prstGeom prst="rect">
@@ -8585,7 +8572,7 @@
         </p:nvCxnSpPr>
         <p:spPr>
           <a:xfrm flipV="1">
-            <a:off x="2420968" y="2513523"/>
+            <a:off x="1957327" y="2693829"/>
             <a:ext cx="746973" cy="471747"/>
           </a:xfrm>
           <a:prstGeom prst="bentConnector3">
@@ -8621,7 +8608,7 @@
         </p:nvCxnSpPr>
         <p:spPr>
           <a:xfrm>
-            <a:off x="2420968" y="2034084"/>
+            <a:off x="1957327" y="2214390"/>
             <a:ext cx="746973" cy="479439"/>
           </a:xfrm>
           <a:prstGeom prst="bentConnector3">
@@ -8654,7 +8641,7 @@
         </p:nvSpPr>
         <p:spPr>
           <a:xfrm>
-            <a:off x="4908920" y="2663298"/>
+            <a:off x="4445279" y="2843604"/>
             <a:ext cx="1171978" cy="643944"/>
           </a:xfrm>
           <a:prstGeom prst="rect">
@@ -8708,7 +8695,7 @@
         </p:nvCxnSpPr>
         <p:spPr>
           <a:xfrm flipV="1">
-            <a:off x="4340948" y="2034084"/>
+            <a:off x="3877307" y="2214390"/>
             <a:ext cx="567972" cy="479439"/>
           </a:xfrm>
           <a:prstGeom prst="bentConnector3">
@@ -8744,7 +8731,7 @@
         </p:nvCxnSpPr>
         <p:spPr>
           <a:xfrm>
-            <a:off x="4340948" y="2513523"/>
+            <a:off x="3877307" y="2693829"/>
             <a:ext cx="567972" cy="471747"/>
           </a:xfrm>
           <a:prstGeom prst="bentConnector3">
@@ -8777,7 +8764,7 @@
         </p:nvSpPr>
         <p:spPr>
           <a:xfrm>
-            <a:off x="8275104" y="1753192"/>
+            <a:off x="7811463" y="1933498"/>
             <a:ext cx="1171978" cy="643944"/>
           </a:xfrm>
           <a:prstGeom prst="rect">
@@ -8832,7 +8819,7 @@
         </p:nvSpPr>
         <p:spPr>
           <a:xfrm>
-            <a:off x="8275104" y="2719108"/>
+            <a:off x="7811463" y="2899414"/>
             <a:ext cx="1171978" cy="643944"/>
           </a:xfrm>
           <a:prstGeom prst="rect">
@@ -8890,7 +8877,7 @@
         </p:nvCxnSpPr>
         <p:spPr>
           <a:xfrm>
-            <a:off x="8861093" y="2397136"/>
+            <a:off x="8397452" y="2577442"/>
             <a:ext cx="0" cy="321972"/>
           </a:xfrm>
           <a:prstGeom prst="straightConnector1">
@@ -8923,7 +8910,7 @@
         </p:nvSpPr>
         <p:spPr>
           <a:xfrm>
-            <a:off x="8275104" y="4451317"/>
+            <a:off x="7811463" y="4631623"/>
             <a:ext cx="1171978" cy="643944"/>
           </a:xfrm>
           <a:prstGeom prst="roundRect">
@@ -8967,7 +8954,7 @@
         </p:nvSpPr>
         <p:spPr>
           <a:xfrm>
-            <a:off x="9712256" y="4451317"/>
+            <a:off x="9248615" y="4631623"/>
             <a:ext cx="1171978" cy="643944"/>
           </a:xfrm>
           <a:prstGeom prst="roundRect">
@@ -9014,7 +9001,7 @@
         </p:nvCxnSpPr>
         <p:spPr>
           <a:xfrm rot="5400000">
-            <a:off x="7598385" y="3188608"/>
+            <a:off x="7134744" y="3368914"/>
             <a:ext cx="1088265" cy="1437152"/>
           </a:xfrm>
           <a:prstGeom prst="bentConnector3">
@@ -9052,7 +9039,7 @@
         </p:nvCxnSpPr>
         <p:spPr>
           <a:xfrm rot="16200000" flipH="1">
-            <a:off x="9035537" y="3188608"/>
+            <a:off x="8571896" y="3368914"/>
             <a:ext cx="1088265" cy="1437152"/>
           </a:xfrm>
           <a:prstGeom prst="bentConnector3">
@@ -9090,7 +9077,7 @@
         </p:nvCxnSpPr>
         <p:spPr>
           <a:xfrm>
-            <a:off x="8861093" y="3363052"/>
+            <a:off x="8397452" y="3543358"/>
             <a:ext cx="0" cy="1088265"/>
           </a:xfrm>
           <a:prstGeom prst="straightConnector1">
@@ -9123,7 +9110,7 @@
         </p:nvCxnSpPr>
         <p:spPr>
           <a:xfrm>
-            <a:off x="4649271" y="2513523"/>
+            <a:off x="4185630" y="2693829"/>
             <a:ext cx="4211307" cy="1115691"/>
           </a:xfrm>
           <a:prstGeom prst="bentConnector3">
@@ -9156,7 +9143,7 @@
         </p:nvSpPr>
         <p:spPr>
           <a:xfrm rot="5400000">
-            <a:off x="8641717" y="3447419"/>
+            <a:off x="8178076" y="3627725"/>
             <a:ext cx="427017" cy="4034549"/>
           </a:xfrm>
           <a:prstGeom prst="rightBrace">
@@ -9198,7 +9185,7 @@
         </p:nvSpPr>
         <p:spPr>
           <a:xfrm>
-            <a:off x="6520451" y="5917364"/>
+            <a:off x="6056810" y="6097670"/>
             <a:ext cx="4669548" cy="369332"/>
           </a:xfrm>
           <a:prstGeom prst="rect">
@@ -9235,13 +9222,13 @@
         </p:nvCxnSpPr>
         <p:spPr>
           <a:xfrm rot="10800000">
-            <a:off x="2420968" y="3936457"/>
+            <a:off x="1957327" y="4116763"/>
             <a:ext cx="4416985" cy="836833"/>
           </a:xfrm>
           <a:prstGeom prst="bentConnector3">
             <a:avLst/>
           </a:prstGeom>
-          <a:ln>
+          <a:ln w="38100">
             <a:tailEnd type="triangle"/>
           </a:ln>
         </p:spPr>
@@ -9268,7 +9255,7 @@
         </p:nvSpPr>
         <p:spPr>
           <a:xfrm>
-            <a:off x="4580553" y="4508290"/>
+            <a:off x="4168428" y="4649959"/>
             <a:ext cx="1106008" cy="307777"/>
           </a:xfrm>
           <a:prstGeom prst="rect">
@@ -9294,6 +9281,295 @@
           </a:p>
         </p:txBody>
       </p:sp>
+      <p:cxnSp>
+        <p:nvCxnSpPr>
+          <p:cNvPr id="3" name="Conector angular 2"/>
+          <p:cNvCxnSpPr>
+            <a:stCxn id="19" idx="0"/>
+            <a:endCxn id="36" idx="1"/>
+          </p:cNvCxnSpPr>
+          <p:nvPr/>
+        </p:nvCxnSpPr>
+        <p:spPr>
+          <a:xfrm rot="5400000" flipH="1" flipV="1">
+            <a:off x="6032139" y="-1134392"/>
+            <a:ext cx="764915" cy="6247584"/>
+          </a:xfrm>
+          <a:prstGeom prst="bentConnector2">
+            <a:avLst/>
+          </a:prstGeom>
+          <a:ln w="38100">
+            <a:tailEnd type="triangle"/>
+          </a:ln>
+        </p:spPr>
+        <p:style>
+          <a:lnRef idx="1">
+            <a:schemeClr val="accent1"/>
+          </a:lnRef>
+          <a:fillRef idx="0">
+            <a:schemeClr val="accent1"/>
+          </a:fillRef>
+          <a:effectRef idx="0">
+            <a:schemeClr val="accent1"/>
+          </a:effectRef>
+          <a:fontRef idx="minor">
+            <a:schemeClr val="tx1"/>
+          </a:fontRef>
+        </p:style>
+      </p:cxnSp>
+      <p:sp>
+        <p:nvSpPr>
+          <p:cNvPr id="36" name="Rectángulo redondeado 35"/>
+          <p:cNvSpPr/>
+          <p:nvPr/>
+        </p:nvSpPr>
+        <p:spPr>
+          <a:xfrm>
+            <a:off x="9538388" y="958414"/>
+            <a:ext cx="1732206" cy="1297056"/>
+          </a:xfrm>
+          <a:prstGeom prst="roundRect">
+            <a:avLst/>
+          </a:prstGeom>
+        </p:spPr>
+        <p:style>
+          <a:lnRef idx="2">
+            <a:schemeClr val="accent2">
+              <a:shade val="50000"/>
+            </a:schemeClr>
+          </a:lnRef>
+          <a:fillRef idx="1">
+            <a:schemeClr val="accent2"/>
+          </a:fillRef>
+          <a:effectRef idx="0">
+            <a:schemeClr val="accent2"/>
+          </a:effectRef>
+          <a:fontRef idx="minor">
+            <a:schemeClr val="lt1"/>
+          </a:fontRef>
+        </p:style>
+        <p:txBody>
+          <a:bodyPr rtlCol="0" anchor="ctr"/>
+          <a:lstStyle/>
+          <a:p>
+            <a:r>
+              <a:rPr lang="es-CL" sz="1600" dirty="0" smtClean="0"/>
+              <a:t>Cargar datos con el </a:t>
+            </a:r>
+            <a:r>
+              <a:rPr lang="es-CL" sz="1600" dirty="0" err="1" smtClean="0"/>
+              <a:t>poll</a:t>
+            </a:r>
+            <a:r>
+              <a:rPr lang="es-CL" sz="1600" dirty="0" smtClean="0"/>
+              <a:t> en:</a:t>
+            </a:r>
+          </a:p>
+          <a:p>
+            <a:r>
+              <a:rPr lang="es-CL" sz="1600" dirty="0" smtClean="0">
+                <a:solidFill>
+                  <a:schemeClr val="accent1">
+                    <a:lumMod val="50000"/>
+                  </a:schemeClr>
+                </a:solidFill>
+              </a:rPr>
+              <a:t>- </a:t>
+            </a:r>
+            <a:r>
+              <a:rPr lang="es-CL" sz="1600" dirty="0" err="1" smtClean="0">
+                <a:solidFill>
+                  <a:schemeClr val="accent1">
+                    <a:lumMod val="50000"/>
+                  </a:schemeClr>
+                </a:solidFill>
+              </a:rPr>
+              <a:t>acveditRDS</a:t>
+            </a:r>
+            <a:r>
+              <a:rPr lang="es-CL" sz="1600" dirty="0" smtClean="0">
+                <a:solidFill>
+                  <a:schemeClr val="accent1">
+                    <a:lumMod val="50000"/>
+                  </a:schemeClr>
+                </a:solidFill>
+              </a:rPr>
+              <a:t>()</a:t>
+            </a:r>
+          </a:p>
+          <a:p>
+            <a:r>
+              <a:rPr lang="es-CL" sz="1600" dirty="0" smtClean="0">
+                <a:solidFill>
+                  <a:schemeClr val="accent1">
+                    <a:lumMod val="50000"/>
+                  </a:schemeClr>
+                </a:solidFill>
+              </a:rPr>
+              <a:t>- </a:t>
+            </a:r>
+            <a:r>
+              <a:rPr lang="es-CL" sz="1600" dirty="0" err="1" smtClean="0">
+                <a:solidFill>
+                  <a:schemeClr val="accent1">
+                    <a:lumMod val="50000"/>
+                  </a:schemeClr>
+                </a:solidFill>
+              </a:rPr>
+              <a:t>filerRDS</a:t>
+            </a:r>
+            <a:r>
+              <a:rPr lang="es-CL" sz="1600" dirty="0" smtClean="0">
+                <a:solidFill>
+                  <a:schemeClr val="accent1">
+                    <a:lumMod val="50000"/>
+                  </a:schemeClr>
+                </a:solidFill>
+              </a:rPr>
+              <a:t>()</a:t>
+            </a:r>
+            <a:endParaRPr lang="es-419" sz="1600" dirty="0">
+              <a:solidFill>
+                <a:schemeClr val="accent1">
+                  <a:lumMod val="50000"/>
+                </a:schemeClr>
+              </a:solidFill>
+            </a:endParaRPr>
+          </a:p>
+        </p:txBody>
+      </p:sp>
+      <p:sp>
+        <p:nvSpPr>
+          <p:cNvPr id="15" name="CuadroTexto 14"/>
+          <p:cNvSpPr txBox="1"/>
+          <p:nvPr/>
+        </p:nvSpPr>
+        <p:spPr>
+          <a:xfrm>
+            <a:off x="9431188" y="2327888"/>
+            <a:ext cx="2000955" cy="1384995"/>
+          </a:xfrm>
+          <a:prstGeom prst="rect">
+            <a:avLst/>
+          </a:prstGeom>
+          <a:noFill/>
+        </p:spPr>
+        <p:txBody>
+          <a:bodyPr wrap="square" rtlCol="0">
+            <a:spAutoFit/>
+          </a:bodyPr>
+          <a:lstStyle/>
+          <a:p>
+            <a:r>
+              <a:rPr lang="es-CL" sz="1400" dirty="0" smtClean="0"/>
+              <a:t>Habiendo seleccionado un sujeto y por tanto un </a:t>
+            </a:r>
+            <a:r>
+              <a:rPr lang="es-CL" sz="1400" dirty="0" err="1" smtClean="0"/>
+              <a:t>awdfile</a:t>
+            </a:r>
+            <a:r>
+              <a:rPr lang="es-CL" sz="1400" dirty="0" smtClean="0"/>
+              <a:t>() </a:t>
+            </a:r>
+            <a:r>
+              <a:rPr lang="es-CL" sz="1400" dirty="0" err="1" smtClean="0"/>
+              <a:t>object</a:t>
+            </a:r>
+            <a:r>
+              <a:rPr lang="es-CL" sz="1400" dirty="0" smtClean="0"/>
+              <a:t> se cargarán los datos y siempre habrá datos cargados.</a:t>
+            </a:r>
+            <a:endParaRPr lang="es-419" sz="1400" dirty="0"/>
+          </a:p>
+        </p:txBody>
+      </p:sp>
+      <p:sp>
+        <p:nvSpPr>
+          <p:cNvPr id="16" name="Rectángulo 15"/>
+          <p:cNvSpPr/>
+          <p:nvPr/>
+        </p:nvSpPr>
+        <p:spPr>
+          <a:xfrm>
+            <a:off x="785349" y="4853324"/>
+            <a:ext cx="1171977" cy="497666"/>
+          </a:xfrm>
+          <a:prstGeom prst="rect">
+            <a:avLst/>
+          </a:prstGeom>
+        </p:spPr>
+        <p:style>
+          <a:lnRef idx="2">
+            <a:schemeClr val="accent6"/>
+          </a:lnRef>
+          <a:fillRef idx="1">
+            <a:schemeClr val="lt1"/>
+          </a:fillRef>
+          <a:effectRef idx="0">
+            <a:schemeClr val="accent6"/>
+          </a:effectRef>
+          <a:fontRef idx="minor">
+            <a:schemeClr val="dk1"/>
+          </a:fontRef>
+        </p:style>
+        <p:txBody>
+          <a:bodyPr rtlCol="0" anchor="ctr"/>
+          <a:lstStyle/>
+          <a:p>
+            <a:pPr algn="ctr"/>
+            <a:r>
+              <a:rPr lang="es-CL" dirty="0" err="1" smtClean="0"/>
+              <a:t>Via</a:t>
+            </a:r>
+            <a:r>
+              <a:rPr lang="es-CL" dirty="0" smtClean="0"/>
+              <a:t> </a:t>
+            </a:r>
+            <a:r>
+              <a:rPr lang="es-CL" dirty="0" err="1" smtClean="0"/>
+              <a:t>Poll</a:t>
+            </a:r>
+            <a:endParaRPr lang="es-419" dirty="0"/>
+          </a:p>
+        </p:txBody>
+      </p:sp>
+      <p:cxnSp>
+        <p:nvCxnSpPr>
+          <p:cNvPr id="18" name="Conector recto de flecha 17"/>
+          <p:cNvCxnSpPr>
+            <a:stCxn id="16" idx="0"/>
+            <a:endCxn id="48" idx="2"/>
+          </p:cNvCxnSpPr>
+          <p:nvPr/>
+        </p:nvCxnSpPr>
+        <p:spPr>
+          <a:xfrm flipV="1">
+            <a:off x="1371338" y="4438734"/>
+            <a:ext cx="515" cy="414590"/>
+          </a:xfrm>
+          <a:prstGeom prst="straightConnector1">
+            <a:avLst/>
+          </a:prstGeom>
+          <a:ln w="38100">
+            <a:tailEnd type="triangle"/>
+          </a:ln>
+        </p:spPr>
+        <p:style>
+          <a:lnRef idx="1">
+            <a:schemeClr val="accent1"/>
+          </a:lnRef>
+          <a:fillRef idx="0">
+            <a:schemeClr val="accent1"/>
+          </a:fillRef>
+          <a:effectRef idx="0">
+            <a:schemeClr val="accent1"/>
+          </a:effectRef>
+          <a:fontRef idx="minor">
+            <a:schemeClr val="tx1"/>
+          </a:fontRef>
+        </p:style>
+      </p:cxnSp>
     </p:spTree>
     <p:extLst>
       <p:ext uri="{BB962C8B-B14F-4D97-AF65-F5344CB8AC3E}">
@@ -9368,7 +9644,7 @@
           <a:p>
             <a:pPr algn="ctr"/>
             <a:r>
-              <a:rPr lang="es-CL" sz="1600" smtClean="0"/>
+              <a:rPr lang="es-CL" sz="1600" dirty="0" err="1" smtClean="0"/>
               <a:t>awdfile</a:t>
             </a:r>
             <a:endParaRPr lang="es-CL" sz="1600" dirty="0" smtClean="0"/>
@@ -9376,8 +9652,16 @@
           <a:p>
             <a:pPr algn="ctr"/>
             <a:r>
-              <a:rPr lang="es-CL" sz="1600" smtClean="0"/>
-              <a:t>(obj:str)</a:t>
+              <a:rPr lang="es-CL" sz="1600" dirty="0" smtClean="0"/>
+              <a:t>(</a:t>
+            </a:r>
+            <a:r>
+              <a:rPr lang="es-CL" sz="1600" dirty="0" err="1" smtClean="0"/>
+              <a:t>obj:str</a:t>
+            </a:r>
+            <a:r>
+              <a:rPr lang="es-CL" sz="1600" dirty="0" smtClean="0"/>
+              <a:t>)</a:t>
             </a:r>
             <a:endParaRPr lang="es-419" sz="1600" dirty="0"/>
           </a:p>

</xml_diff>

<commit_message>
Se agrega finalizar sujeto
Y varios arreglos menores
</commit_message>
<xml_diff>
--- a/flujo edicion.pptx
+++ b/flujo edicion.pptx
@@ -256,7 +256,7 @@
           <a:p>
             <a:fld id="{E142A079-F624-4F06-8292-7991D53C206B}" type="datetimeFigureOut">
               <a:rPr lang="es-419" smtClean="0"/>
-              <a:t>8/4/2020</a:t>
+              <a:t>13/4/2020</a:t>
             </a:fld>
             <a:endParaRPr lang="es-419"/>
           </a:p>
@@ -426,7 +426,7 @@
           <a:p>
             <a:fld id="{E142A079-F624-4F06-8292-7991D53C206B}" type="datetimeFigureOut">
               <a:rPr lang="es-419" smtClean="0"/>
-              <a:t>8/4/2020</a:t>
+              <a:t>13/4/2020</a:t>
             </a:fld>
             <a:endParaRPr lang="es-419"/>
           </a:p>
@@ -606,7 +606,7 @@
           <a:p>
             <a:fld id="{E142A079-F624-4F06-8292-7991D53C206B}" type="datetimeFigureOut">
               <a:rPr lang="es-419" smtClean="0"/>
-              <a:t>8/4/2020</a:t>
+              <a:t>13/4/2020</a:t>
             </a:fld>
             <a:endParaRPr lang="es-419"/>
           </a:p>
@@ -776,7 +776,7 @@
           <a:p>
             <a:fld id="{E142A079-F624-4F06-8292-7991D53C206B}" type="datetimeFigureOut">
               <a:rPr lang="es-419" smtClean="0"/>
-              <a:t>8/4/2020</a:t>
+              <a:t>13/4/2020</a:t>
             </a:fld>
             <a:endParaRPr lang="es-419"/>
           </a:p>
@@ -1022,7 +1022,7 @@
           <a:p>
             <a:fld id="{E142A079-F624-4F06-8292-7991D53C206B}" type="datetimeFigureOut">
               <a:rPr lang="es-419" smtClean="0"/>
-              <a:t>8/4/2020</a:t>
+              <a:t>13/4/2020</a:t>
             </a:fld>
             <a:endParaRPr lang="es-419"/>
           </a:p>
@@ -1254,7 +1254,7 @@
           <a:p>
             <a:fld id="{E142A079-F624-4F06-8292-7991D53C206B}" type="datetimeFigureOut">
               <a:rPr lang="es-419" smtClean="0"/>
-              <a:t>8/4/2020</a:t>
+              <a:t>13/4/2020</a:t>
             </a:fld>
             <a:endParaRPr lang="es-419"/>
           </a:p>
@@ -1621,7 +1621,7 @@
           <a:p>
             <a:fld id="{E142A079-F624-4F06-8292-7991D53C206B}" type="datetimeFigureOut">
               <a:rPr lang="es-419" smtClean="0"/>
-              <a:t>8/4/2020</a:t>
+              <a:t>13/4/2020</a:t>
             </a:fld>
             <a:endParaRPr lang="es-419"/>
           </a:p>
@@ -1739,7 +1739,7 @@
           <a:p>
             <a:fld id="{E142A079-F624-4F06-8292-7991D53C206B}" type="datetimeFigureOut">
               <a:rPr lang="es-419" smtClean="0"/>
-              <a:t>8/4/2020</a:t>
+              <a:t>13/4/2020</a:t>
             </a:fld>
             <a:endParaRPr lang="es-419"/>
           </a:p>
@@ -1834,7 +1834,7 @@
           <a:p>
             <a:fld id="{E142A079-F624-4F06-8292-7991D53C206B}" type="datetimeFigureOut">
               <a:rPr lang="es-419" smtClean="0"/>
-              <a:t>8/4/2020</a:t>
+              <a:t>13/4/2020</a:t>
             </a:fld>
             <a:endParaRPr lang="es-419"/>
           </a:p>
@@ -2111,7 +2111,7 @@
           <a:p>
             <a:fld id="{E142A079-F624-4F06-8292-7991D53C206B}" type="datetimeFigureOut">
               <a:rPr lang="es-419" smtClean="0"/>
-              <a:t>8/4/2020</a:t>
+              <a:t>13/4/2020</a:t>
             </a:fld>
             <a:endParaRPr lang="es-419"/>
           </a:p>
@@ -2364,7 +2364,7 @@
           <a:p>
             <a:fld id="{E142A079-F624-4F06-8292-7991D53C206B}" type="datetimeFigureOut">
               <a:rPr lang="es-419" smtClean="0"/>
-              <a:t>8/4/2020</a:t>
+              <a:t>13/4/2020</a:t>
             </a:fld>
             <a:endParaRPr lang="es-419"/>
           </a:p>
@@ -2577,7 +2577,7 @@
           <a:p>
             <a:fld id="{E142A079-F624-4F06-8292-7991D53C206B}" type="datetimeFigureOut">
               <a:rPr lang="es-419" smtClean="0"/>
-              <a:t>8/4/2020</a:t>
+              <a:t>13/4/2020</a:t>
             </a:fld>
             <a:endParaRPr lang="es-419"/>
           </a:p>
@@ -8094,7 +8094,7 @@
         <p:spPr>
           <a:xfrm>
             <a:off x="180304" y="180304"/>
-            <a:ext cx="10170541" cy="954107"/>
+            <a:ext cx="6350585" cy="954107"/>
           </a:xfrm>
           <a:prstGeom prst="rect">
             <a:avLst/>
@@ -8126,23 +8126,46 @@
           </a:p>
           <a:p>
             <a:r>
-              <a:rPr lang="es-CL" sz="1600" dirty="0" smtClean="0"/>
-              <a:t>Desde que se inicia el programa esta es más menos el </a:t>
-            </a:r>
-            <a:r>
-              <a:rPr lang="es-CL" sz="1600" dirty="0" err="1" smtClean="0"/>
-              <a:t>interLink</a:t>
-            </a:r>
-            <a:r>
-              <a:rPr lang="es-CL" sz="1600" dirty="0" smtClean="0"/>
+              <a:rPr lang="es-ES" sz="1600" smtClean="0"/>
+              <a:t>Está rarísimo lo de los colores y entenderlo, como sea no está complicado.</a:t>
+            </a:r>
+            <a:endParaRPr lang="es-CL" sz="1600" dirty="0" smtClean="0"/>
+          </a:p>
+          <a:p>
+            <a:r>
+              <a:rPr lang="es-ES" sz="1600" smtClean="0"/>
+              <a:t>El </a:t>
+            </a:r>
+            <a:r>
+              <a:rPr lang="es-ES" sz="1600" smtClean="0">
+                <a:solidFill>
+                  <a:srgbClr val="FF0000"/>
+                </a:solidFill>
+              </a:rPr>
+              <a:t>terminado </a:t>
+            </a:r>
+            <a:r>
+              <a:rPr lang="es-ES" sz="1600" smtClean="0"/>
+              <a:t>es un file que se debe leer y capturar en </a:t>
+            </a:r>
+            <a:r>
+              <a:rPr lang="es-ES" sz="1600" smtClean="0">
+                <a:effectLst>
+                  <a:outerShdw blurRad="38100" dist="38100" dir="2700000" algn="tl">
+                    <a:srgbClr val="000000">
+                      <a:alpha val="43137"/>
+                    </a:srgbClr>
+                  </a:outerShdw>
+                </a:effectLst>
+                <a:latin typeface="Consolas" panose="020B0609020204030204" pitchFamily="49" charset="0"/>
+              </a:rPr>
+              <a:t>subjectDF()</a:t>
+            </a:r>
+            <a:r>
+              <a:rPr lang="es-ES" sz="1600" smtClean="0"/>
               <a:t>.</a:t>
             </a:r>
-          </a:p>
-          <a:p>
-            <a:r>
-              <a:rPr lang="es-CL" sz="1600" dirty="0" smtClean="0"/>
-              <a:t>La idea es detectar que está en edición, sin procesar, terminado y poder seleccionar a ese sujeto en la siguiente pestaña </a:t>
-            </a:r>
+            <a:endParaRPr lang="es-CL" sz="1600" dirty="0" smtClean="0"/>
           </a:p>
         </p:txBody>
       </p:sp>
@@ -9840,6 +9863,48 @@
           </a:fontRef>
         </p:style>
       </p:cxnSp>
+      <p:sp>
+        <p:nvSpPr>
+          <p:cNvPr id="2" name="Elipse 1"/>
+          <p:cNvSpPr/>
+          <p:nvPr/>
+        </p:nvSpPr>
+        <p:spPr>
+          <a:xfrm>
+            <a:off x="3514190" y="4007859"/>
+            <a:ext cx="270340" cy="277428"/>
+          </a:xfrm>
+          <a:prstGeom prst="ellipse">
+            <a:avLst/>
+          </a:prstGeom>
+        </p:spPr>
+        <p:style>
+          <a:lnRef idx="2">
+            <a:schemeClr val="accent2"/>
+          </a:lnRef>
+          <a:fillRef idx="1">
+            <a:schemeClr val="lt1"/>
+          </a:fillRef>
+          <a:effectRef idx="0">
+            <a:schemeClr val="accent2"/>
+          </a:effectRef>
+          <a:fontRef idx="minor">
+            <a:schemeClr val="dk1"/>
+          </a:fontRef>
+        </p:style>
+        <p:txBody>
+          <a:bodyPr rtlCol="0" anchor="ctr"/>
+          <a:lstStyle/>
+          <a:p>
+            <a:pPr algn="ctr"/>
+            <a:r>
+              <a:rPr lang="es-ES" smtClean="0"/>
+              <a:t>1</a:t>
+            </a:r>
+            <a:endParaRPr lang="es-CL"/>
+          </a:p>
+        </p:txBody>
+      </p:sp>
     </p:spTree>
     <p:extLst>
       <p:ext uri="{BB962C8B-B14F-4D97-AF65-F5344CB8AC3E}">

</xml_diff>